<commit_message>
Added day-two and day-three to clinical-statistics
</commit_message>
<xml_diff>
--- a/clinical-statistics/day-one.pptx
+++ b/clinical-statistics/day-one.pptx
@@ -5,7 +5,7 @@
     <p:sldMasterId id="2147483648" r:id="rId1"/>
   </p:sldMasterIdLst>
   <p:notesMasterIdLst>
-    <p:notesMasterId r:id="rId11"/>
+    <p:notesMasterId r:id="rId20"/>
   </p:notesMasterIdLst>
   <p:sldIdLst>
     <p:sldId id="256" r:id="rId2"/>
@@ -17,6 +17,15 @@
     <p:sldId id="262" r:id="rId8"/>
     <p:sldId id="263" r:id="rId9"/>
     <p:sldId id="264" r:id="rId10"/>
+    <p:sldId id="265" r:id="rId11"/>
+    <p:sldId id="266" r:id="rId12"/>
+    <p:sldId id="267" r:id="rId13"/>
+    <p:sldId id="268" r:id="rId14"/>
+    <p:sldId id="269" r:id="rId15"/>
+    <p:sldId id="270" r:id="rId16"/>
+    <p:sldId id="271" r:id="rId17"/>
+    <p:sldId id="272" r:id="rId18"/>
+    <p:sldId id="273" r:id="rId19"/>
   </p:sldIdLst>
   <p:sldSz cx="9144000" cy="5143500" type="screen16x9"/>
   <p:notesSz cx="6858000" cy="9144000"/>
@@ -3765,6 +3774,652 @@
 </p:sld>
 </file>
 
+<file path=ppt/slides/slide10.xml><?xml version="1.0" encoding="utf-8"?>
+<p:sld xmlns:a="http://schemas.openxmlformats.org/drawingml/2006/main" xmlns:r="http://schemas.openxmlformats.org/officeDocument/2006/relationships" xmlns:p="http://schemas.openxmlformats.org/presentationml/2006/main">
+  <p:cSld>
+    <p:spTree>
+      <p:nvGrpSpPr>
+        <p:cNvPr id="1" name=""/>
+        <p:cNvGrpSpPr/>
+        <p:nvPr/>
+      </p:nvGrpSpPr>
+      <p:grpSpPr>
+        <a:xfrm>
+          <a:off x="0" y="0"/>
+          <a:ext cx="0" cy="0"/>
+          <a:chOff x="0" y="0"/>
+          <a:chExt cx="0" cy="0"/>
+        </a:xfrm>
+      </p:grpSpPr>
+      <p:sp>
+        <p:nvSpPr>
+          <p:cNvPr id="2" name="Title 1"/>
+          <p:cNvSpPr>
+            <a:spLocks noGrp="1"/>
+          </p:cNvSpPr>
+          <p:nvPr>
+            <p:ph type="title"/>
+          </p:nvPr>
+        </p:nvSpPr>
+        <p:spPr/>
+        <p:txBody>
+          <a:bodyPr/>
+          <a:lstStyle/>
+          <a:p>
+            <a:pPr lvl="0" indent="0" marL="0">
+              <a:buNone/>
+            </a:pPr>
+            <a:r>
+              <a:rPr/>
+              <a:t>Mean bacteria count</a:t>
+            </a:r>
+          </a:p>
+        </p:txBody>
+      </p:sp>
+    </p:spTree>
+  </p:cSld>
+</p:sld>
+</file>
+
+<file path=ppt/slides/slide11.xml><?xml version="1.0" encoding="utf-8"?>
+<p:sld xmlns:a="http://schemas.openxmlformats.org/drawingml/2006/main" xmlns:r="http://schemas.openxmlformats.org/officeDocument/2006/relationships" xmlns:p="http://schemas.openxmlformats.org/presentationml/2006/main">
+  <p:cSld>
+    <p:spTree>
+      <p:nvGrpSpPr>
+        <p:cNvPr id="1" name=""/>
+        <p:cNvGrpSpPr/>
+        <p:nvPr/>
+      </p:nvGrpSpPr>
+      <p:grpSpPr>
+        <a:xfrm>
+          <a:off x="0" y="0"/>
+          <a:ext cx="0" cy="0"/>
+          <a:chOff x="0" y="0"/>
+          <a:chExt cx="0" cy="0"/>
+        </a:xfrm>
+      </p:grpSpPr>
+      <p:sp>
+        <p:nvSpPr>
+          <p:cNvPr id="2" name="Title 1"/>
+          <p:cNvSpPr>
+            <a:spLocks noGrp="1"/>
+          </p:cNvSpPr>
+          <p:nvPr>
+            <p:ph type="title"/>
+          </p:nvPr>
+        </p:nvSpPr>
+        <p:spPr/>
+        <p:txBody>
+          <a:bodyPr/>
+          <a:lstStyle/>
+          <a:p>
+            <a:pPr lvl="0" indent="0" marL="0">
+              <a:buNone/>
+            </a:pPr>
+            <a:r>
+              <a:rPr/>
+              <a:t>Before mean = 11.325</a:t>
+            </a:r>
+          </a:p>
+        </p:txBody>
+      </p:sp>
+      <p:sp>
+        <p:nvSpPr>
+          <p:cNvPr id="3" name="Content Placeholder 2"/>
+          <p:cNvSpPr>
+            <a:spLocks noGrp="1"/>
+          </p:cNvSpPr>
+          <p:nvPr>
+            <p:ph idx="1"/>
+          </p:nvPr>
+        </p:nvSpPr>
+        <p:spPr/>
+        <p:txBody>
+          <a:bodyPr/>
+          <a:lstStyle/>
+          <a:p>
+            <a:pPr lvl="0" indent="0">
+              <a:buNone/>
+            </a:pPr>
+            <a:r>
+              <a:rPr>
+                <a:latin typeface="Courier"/>
+              </a:rPr>
+              <a:t>11.8 + 7.1 + 8.2 + 10.1 + 10.8 + 14 + 14.6 + 14 = 90.6
+90.6 / 8 = 11.325</a:t>
+            </a:r>
+          </a:p>
+        </p:txBody>
+      </p:sp>
+    </p:spTree>
+  </p:cSld>
+</p:sld>
+</file>
+
+<file path=ppt/slides/slide12.xml><?xml version="1.0" encoding="utf-8"?>
+<p:sld xmlns:a="http://schemas.openxmlformats.org/drawingml/2006/main" xmlns:r="http://schemas.openxmlformats.org/officeDocument/2006/relationships" xmlns:p="http://schemas.openxmlformats.org/presentationml/2006/main">
+  <p:cSld>
+    <p:spTree>
+      <p:nvGrpSpPr>
+        <p:cNvPr id="1" name=""/>
+        <p:cNvGrpSpPr/>
+        <p:nvPr/>
+      </p:nvGrpSpPr>
+      <p:grpSpPr>
+        <a:xfrm>
+          <a:off x="0" y="0"/>
+          <a:ext cx="0" cy="0"/>
+          <a:chOff x="0" y="0"/>
+          <a:chExt cx="0" cy="0"/>
+        </a:xfrm>
+      </p:grpSpPr>
+      <p:sp>
+        <p:nvSpPr>
+          <p:cNvPr id="2" name="Title 1"/>
+          <p:cNvSpPr>
+            <a:spLocks noGrp="1"/>
+          </p:cNvSpPr>
+          <p:nvPr>
+            <p:ph type="title"/>
+          </p:nvPr>
+        </p:nvSpPr>
+        <p:spPr/>
+        <p:txBody>
+          <a:bodyPr/>
+          <a:lstStyle/>
+          <a:p>
+            <a:pPr lvl="0" indent="0" marL="0">
+              <a:buNone/>
+            </a:pPr>
+            <a:r>
+              <a:rPr/>
+              <a:t>After mean =</a:t>
+            </a:r>
+          </a:p>
+        </p:txBody>
+      </p:sp>
+      <p:sp>
+        <p:nvSpPr>
+          <p:cNvPr id="3" name="Content Placeholder 2"/>
+          <p:cNvSpPr>
+            <a:spLocks noGrp="1"/>
+          </p:cNvSpPr>
+          <p:nvPr>
+            <p:ph idx="1"/>
+          </p:nvPr>
+        </p:nvSpPr>
+        <p:spPr/>
+        <p:txBody>
+          <a:bodyPr/>
+          <a:lstStyle/>
+          <a:p>
+            <a:pPr lvl="0" indent="0">
+              <a:buNone/>
+            </a:pPr>
+            <a:r>
+              <a:rPr>
+                <a:latin typeface="Courier"/>
+              </a:rPr>
+              <a:t>10.1 + 3.8 + 7.2 + 10.5 + 8.3 + 12 + 12.1 + 13.7 = 77.7</a:t>
+            </a:r>
+          </a:p>
+        </p:txBody>
+      </p:sp>
+    </p:spTree>
+  </p:cSld>
+</p:sld>
+</file>
+
+<file path=ppt/slides/slide13.xml><?xml version="1.0" encoding="utf-8"?>
+<p:sld xmlns:a="http://schemas.openxmlformats.org/drawingml/2006/main" xmlns:r="http://schemas.openxmlformats.org/officeDocument/2006/relationships" xmlns:p="http://schemas.openxmlformats.org/presentationml/2006/main">
+  <p:cSld>
+    <p:spTree>
+      <p:nvGrpSpPr>
+        <p:cNvPr id="1" name=""/>
+        <p:cNvGrpSpPr/>
+        <p:nvPr/>
+      </p:nvGrpSpPr>
+      <p:grpSpPr>
+        <a:xfrm>
+          <a:off x="0" y="0"/>
+          <a:ext cx="0" cy="0"/>
+          <a:chOff x="0" y="0"/>
+          <a:chExt cx="0" cy="0"/>
+        </a:xfrm>
+      </p:grpSpPr>
+      <p:sp>
+        <p:nvSpPr>
+          <p:cNvPr id="2" name="Title 1"/>
+          <p:cNvSpPr>
+            <a:spLocks noGrp="1"/>
+          </p:cNvSpPr>
+          <p:nvPr>
+            <p:ph type="title"/>
+          </p:nvPr>
+        </p:nvSpPr>
+        <p:spPr/>
+        <p:txBody>
+          <a:bodyPr/>
+          <a:lstStyle/>
+          <a:p>
+            <a:pPr lvl="0" indent="0" marL="0">
+              <a:buNone/>
+            </a:pPr>
+            <a:r>
+              <a:rPr/>
+              <a:t>Before Median = 11.3</a:t>
+            </a:r>
+          </a:p>
+        </p:txBody>
+      </p:sp>
+      <p:sp>
+        <p:nvSpPr>
+          <p:cNvPr id="3" name="Content Placeholder 2"/>
+          <p:cNvSpPr>
+            <a:spLocks noGrp="1"/>
+          </p:cNvSpPr>
+          <p:nvPr>
+            <p:ph idx="1"/>
+          </p:nvPr>
+        </p:nvSpPr>
+        <p:spPr/>
+        <p:txBody>
+          <a:bodyPr/>
+          <a:lstStyle/>
+          <a:p>
+            <a:pPr lvl="0" indent="0">
+              <a:buNone/>
+            </a:pPr>
+            <a:r>
+              <a:rPr>
+                <a:latin typeface="Courier"/>
+              </a:rPr>
+              <a:t>7.1
+8.2
+10.1
+10.8 10.8
+11.8 11.8
+14.0
+14.0
+14.6</a:t>
+            </a:r>
+          </a:p>
+        </p:txBody>
+      </p:sp>
+    </p:spTree>
+  </p:cSld>
+</p:sld>
+</file>
+
+<file path=ppt/slides/slide14.xml><?xml version="1.0" encoding="utf-8"?>
+<p:sld xmlns:a="http://schemas.openxmlformats.org/drawingml/2006/main" xmlns:r="http://schemas.openxmlformats.org/officeDocument/2006/relationships" xmlns:p="http://schemas.openxmlformats.org/presentationml/2006/main">
+  <p:cSld>
+    <p:spTree>
+      <p:nvGrpSpPr>
+        <p:cNvPr id="1" name=""/>
+        <p:cNvGrpSpPr/>
+        <p:nvPr/>
+      </p:nvGrpSpPr>
+      <p:grpSpPr>
+        <a:xfrm>
+          <a:off x="0" y="0"/>
+          <a:ext cx="0" cy="0"/>
+          <a:chOff x="0" y="0"/>
+          <a:chExt cx="0" cy="0"/>
+        </a:xfrm>
+      </p:grpSpPr>
+      <p:sp>
+        <p:nvSpPr>
+          <p:cNvPr id="2" name="Title 1"/>
+          <p:cNvSpPr>
+            <a:spLocks noGrp="1"/>
+          </p:cNvSpPr>
+          <p:nvPr>
+            <p:ph type="title"/>
+          </p:nvPr>
+        </p:nvSpPr>
+        <p:spPr/>
+        <p:txBody>
+          <a:bodyPr/>
+          <a:lstStyle/>
+          <a:p>
+            <a:pPr lvl="0" indent="0" marL="0">
+              <a:buNone/>
+            </a:pPr>
+            <a:r>
+              <a:rPr/>
+              <a:t>After Median = 10.3</a:t>
+            </a:r>
+          </a:p>
+        </p:txBody>
+      </p:sp>
+      <p:sp>
+        <p:nvSpPr>
+          <p:cNvPr id="3" name="Content Placeholder 2"/>
+          <p:cNvSpPr>
+            <a:spLocks noGrp="1"/>
+          </p:cNvSpPr>
+          <p:nvPr>
+            <p:ph idx="1"/>
+          </p:nvPr>
+        </p:nvSpPr>
+        <p:spPr/>
+        <p:txBody>
+          <a:bodyPr/>
+          <a:lstStyle/>
+          <a:p>
+            <a:pPr lvl="0" indent="0">
+              <a:buNone/>
+            </a:pPr>
+            <a:r>
+              <a:rPr>
+                <a:latin typeface="Courier"/>
+              </a:rPr>
+              <a:t>3.8
+7.2
+8.3
+10.1 10.1
+10.5 10.5
+12.0
+12.1
+13.7</a:t>
+            </a:r>
+          </a:p>
+        </p:txBody>
+      </p:sp>
+    </p:spTree>
+  </p:cSld>
+</p:sld>
+</file>
+
+<file path=ppt/slides/slide15.xml><?xml version="1.0" encoding="utf-8"?>
+<p:sld xmlns:a="http://schemas.openxmlformats.org/drawingml/2006/main" xmlns:r="http://schemas.openxmlformats.org/officeDocument/2006/relationships" xmlns:p="http://schemas.openxmlformats.org/presentationml/2006/main">
+  <p:cSld>
+    <p:spTree>
+      <p:nvGrpSpPr>
+        <p:cNvPr id="1" name=""/>
+        <p:cNvGrpSpPr/>
+        <p:nvPr/>
+      </p:nvGrpSpPr>
+      <p:grpSpPr>
+        <a:xfrm>
+          <a:off x="0" y="0"/>
+          <a:ext cx="0" cy="0"/>
+          <a:chOff x="0" y="0"/>
+          <a:chExt cx="0" cy="0"/>
+        </a:xfrm>
+      </p:grpSpPr>
+      <p:sp>
+        <p:nvSpPr>
+          <p:cNvPr id="2" name="Title 1"/>
+          <p:cNvSpPr>
+            <a:spLocks noGrp="1"/>
+          </p:cNvSpPr>
+          <p:nvPr>
+            <p:ph type="title"/>
+          </p:nvPr>
+        </p:nvSpPr>
+        <p:spPr/>
+        <p:txBody>
+          <a:bodyPr/>
+          <a:lstStyle/>
+          <a:p>
+            <a:pPr lvl="0" indent="0" marL="0">
+              <a:buNone/>
+            </a:pPr>
+            <a:r>
+              <a:rPr/>
+              <a:t>Next slide</a:t>
+            </a:r>
+          </a:p>
+        </p:txBody>
+      </p:sp>
+      <p:sp>
+        <p:nvSpPr>
+          <p:cNvPr id="3" name="Content Placeholder 2"/>
+          <p:cNvSpPr>
+            <a:spLocks noGrp="1"/>
+          </p:cNvSpPr>
+          <p:nvPr>
+            <p:ph idx="1"/>
+          </p:nvPr>
+        </p:nvSpPr>
+        <p:spPr/>
+        <p:txBody>
+          <a:bodyPr/>
+          <a:lstStyle/>
+          <a:p>
+            <a:pPr lvl="0" indent="0" marL="0">
+              <a:buNone/>
+            </a:pPr>
+            <a:r>
+              <a:rPr/>
+              <a:t>Hypothesis testing • What does a p-value tell you • Why you might prefer a confidence interval • What sample size do you need • How does a Bayesian data analysis differ • What should you do if you do not have a hypothesis to test</a:t>
+            </a:r>
+          </a:p>
+        </p:txBody>
+      </p:sp>
+    </p:spTree>
+  </p:cSld>
+</p:sld>
+</file>
+
+<file path=ppt/slides/slide16.xml><?xml version="1.0" encoding="utf-8"?>
+<p:sld xmlns:a="http://schemas.openxmlformats.org/drawingml/2006/main" xmlns:r="http://schemas.openxmlformats.org/officeDocument/2006/relationships" xmlns:p="http://schemas.openxmlformats.org/presentationml/2006/main">
+  <p:cSld>
+    <p:spTree>
+      <p:nvGrpSpPr>
+        <p:cNvPr id="1" name=""/>
+        <p:cNvGrpSpPr/>
+        <p:nvPr/>
+      </p:nvGrpSpPr>
+      <p:grpSpPr>
+        <a:xfrm>
+          <a:off x="0" y="0"/>
+          <a:ext cx="0" cy="0"/>
+          <a:chOff x="0" y="0"/>
+          <a:chExt cx="0" cy="0"/>
+        </a:xfrm>
+      </p:grpSpPr>
+      <p:sp>
+        <p:nvSpPr>
+          <p:cNvPr id="2" name="Title 1"/>
+          <p:cNvSpPr>
+            <a:spLocks noGrp="1"/>
+          </p:cNvSpPr>
+          <p:nvPr>
+            <p:ph type="title"/>
+          </p:nvPr>
+        </p:nvSpPr>
+        <p:spPr/>
+        <p:txBody>
+          <a:bodyPr/>
+          <a:lstStyle/>
+          <a:p>
+            <a:pPr lvl="0" indent="0" marL="0">
+              <a:buNone/>
+            </a:pPr>
+            <a:r>
+              <a:rPr/>
+              <a:t>Next slide</a:t>
+            </a:r>
+          </a:p>
+        </p:txBody>
+      </p:sp>
+      <p:sp>
+        <p:nvSpPr>
+          <p:cNvPr id="3" name="Content Placeholder 2"/>
+          <p:cNvSpPr>
+            <a:spLocks noGrp="1"/>
+          </p:cNvSpPr>
+          <p:nvPr>
+            <p:ph idx="1"/>
+          </p:nvPr>
+        </p:nvSpPr>
+        <p:spPr/>
+        <p:txBody>
+          <a:bodyPr/>
+          <a:lstStyle/>
+          <a:p>
+            <a:pPr lvl="0" indent="0" marL="0">
+              <a:buNone/>
+            </a:pPr>
+            <a:r>
+              <a:rPr/>
+              <a:t>Sampling • What do you gain with a random sample • When might you prefer a non-random sample • When should you use randomization or blinding • What are the benefits of matching • How can you ensure that your sampling approach is ethical</a:t>
+            </a:r>
+          </a:p>
+        </p:txBody>
+      </p:sp>
+    </p:spTree>
+  </p:cSld>
+</p:sld>
+</file>
+
+<file path=ppt/slides/slide17.xml><?xml version="1.0" encoding="utf-8"?>
+<p:sld xmlns:a="http://schemas.openxmlformats.org/drawingml/2006/main" xmlns:r="http://schemas.openxmlformats.org/officeDocument/2006/relationships" xmlns:p="http://schemas.openxmlformats.org/presentationml/2006/main">
+  <p:cSld>
+    <p:spTree>
+      <p:nvGrpSpPr>
+        <p:cNvPr id="1" name=""/>
+        <p:cNvGrpSpPr/>
+        <p:nvPr/>
+      </p:nvGrpSpPr>
+      <p:grpSpPr>
+        <a:xfrm>
+          <a:off x="0" y="0"/>
+          <a:ext cx="0" cy="0"/>
+          <a:chOff x="0" y="0"/>
+          <a:chExt cx="0" cy="0"/>
+        </a:xfrm>
+      </p:grpSpPr>
+      <p:sp>
+        <p:nvSpPr>
+          <p:cNvPr id="2" name="Title 1"/>
+          <p:cNvSpPr>
+            <a:spLocks noGrp="1"/>
+          </p:cNvSpPr>
+          <p:nvPr>
+            <p:ph type="title"/>
+          </p:nvPr>
+        </p:nvSpPr>
+        <p:spPr/>
+        <p:txBody>
+          <a:bodyPr/>
+          <a:lstStyle/>
+          <a:p>
+            <a:pPr lvl="0" indent="0" marL="0">
+              <a:buNone/>
+            </a:pPr>
+            <a:r>
+              <a:rPr/>
+              <a:t>Next slide</a:t>
+            </a:r>
+          </a:p>
+        </p:txBody>
+      </p:sp>
+      <p:sp>
+        <p:nvSpPr>
+          <p:cNvPr id="3" name="Content Placeholder 2"/>
+          <p:cNvSpPr>
+            <a:spLocks noGrp="1"/>
+          </p:cNvSpPr>
+          <p:nvPr>
+            <p:ph idx="1"/>
+          </p:nvPr>
+        </p:nvSpPr>
+        <p:spPr/>
+        <p:txBody>
+          <a:bodyPr/>
+          <a:lstStyle/>
+          <a:p>
+            <a:pPr lvl="0" indent="0" marL="0">
+              <a:buNone/>
+            </a:pPr>
+            <a:r>
+              <a:rPr/>
+              <a:t>Statistical tests to compare a treatment to a control • What tests should you use for continuous outcomes? • What tests should you use for categorical outcomes? • When should you use nonparametric tests?</a:t>
+            </a:r>
+          </a:p>
+        </p:txBody>
+      </p:sp>
+    </p:spTree>
+  </p:cSld>
+</p:sld>
+</file>
+
+<file path=ppt/slides/slide18.xml><?xml version="1.0" encoding="utf-8"?>
+<p:sld xmlns:a="http://schemas.openxmlformats.org/drawingml/2006/main" xmlns:r="http://schemas.openxmlformats.org/officeDocument/2006/relationships" xmlns:p="http://schemas.openxmlformats.org/presentationml/2006/main">
+  <p:cSld>
+    <p:spTree>
+      <p:nvGrpSpPr>
+        <p:cNvPr id="1" name=""/>
+        <p:cNvGrpSpPr/>
+        <p:nvPr/>
+      </p:nvGrpSpPr>
+      <p:grpSpPr>
+        <a:xfrm>
+          <a:off x="0" y="0"/>
+          <a:ext cx="0" cy="0"/>
+          <a:chOff x="0" y="0"/>
+          <a:chExt cx="0" cy="0"/>
+        </a:xfrm>
+      </p:grpSpPr>
+      <p:sp>
+        <p:nvSpPr>
+          <p:cNvPr id="2" name="Title 1"/>
+          <p:cNvSpPr>
+            <a:spLocks noGrp="1"/>
+          </p:cNvSpPr>
+          <p:nvPr>
+            <p:ph type="title"/>
+          </p:nvPr>
+        </p:nvSpPr>
+        <p:spPr/>
+        <p:txBody>
+          <a:bodyPr/>
+          <a:lstStyle/>
+          <a:p>
+            <a:pPr lvl="0" indent="0" marL="0">
+              <a:buNone/>
+            </a:pPr>
+            <a:r>
+              <a:rPr/>
+              <a:t>Next slide</a:t>
+            </a:r>
+          </a:p>
+        </p:txBody>
+      </p:sp>
+      <p:sp>
+        <p:nvSpPr>
+          <p:cNvPr id="3" name="Content Placeholder 2"/>
+          <p:cNvSpPr>
+            <a:spLocks noGrp="1"/>
+          </p:cNvSpPr>
+          <p:nvPr>
+            <p:ph idx="1"/>
+          </p:nvPr>
+        </p:nvSpPr>
+        <p:spPr/>
+        <p:txBody>
+          <a:bodyPr/>
+          <a:lstStyle/>
+          <a:p>
+            <a:pPr lvl="0" indent="0" marL="0">
+              <a:buNone/>
+            </a:pPr>
+            <a:r>
+              <a:rPr/>
+              <a:t>Regression models • How does a regression model quantify trends • How does logistic regression differ from linear regression • What is a confounding variable • How should you control for or adjust for confounding</a:t>
+            </a:r>
+          </a:p>
+        </p:txBody>
+      </p:sp>
+    </p:spTree>
+  </p:cSld>
+</p:sld>
+</file>
+
 <file path=ppt/slides/slide2.xml><?xml version="1.0" encoding="utf-8"?>
 <p:sld xmlns:a="http://schemas.openxmlformats.org/drawingml/2006/main" xmlns:r="http://schemas.openxmlformats.org/officeDocument/2006/relationships" xmlns:p="http://schemas.openxmlformats.org/presentationml/2006/main">
   <p:cSld>
@@ -4551,14 +5206,14 @@
                 <a:latin typeface="Courier"/>
               </a:rPr>
               <a:t>Room Number Before  After
-       121    11.8   10.1
-       125     7.1    3.8
-       163     8.2    7.2
-       218    10.1   10.5
-       233    10.8    8.3
-       264    14     12
-       324    14.6   12.1
-       325      14     13.7</a:t>
+        121   11.8   10.1
+        125    7.1    3.8
+        163    8.2    7.2
+        218   10.1   10.5
+        233   10.8    8.3
+        264   14     12
+        324   14.6   12.1
+        325   14     13.7</a:t>
             </a:r>
           </a:p>
         </p:txBody>

</xml_diff>

<commit_message>
Started discussion of standard deviation in clinical-statistics
</commit_message>
<xml_diff>
--- a/clinical-statistics/day-one.pptx
+++ b/clinical-statistics/day-one.pptx
@@ -5,7 +5,7 @@
     <p:sldMasterId id="2147483648" r:id="rId1"/>
   </p:sldMasterIdLst>
   <p:notesMasterIdLst>
-    <p:notesMasterId r:id="rId49"/>
+    <p:notesMasterId r:id="rId53"/>
   </p:notesMasterIdLst>
   <p:sldIdLst>
     <p:sldId id="256" r:id="rId2"/>
@@ -55,6 +55,10 @@
     <p:sldId id="300" r:id="rId46"/>
     <p:sldId id="301" r:id="rId47"/>
     <p:sldId id="302" r:id="rId48"/>
+    <p:sldId id="303" r:id="rId49"/>
+    <p:sldId id="304" r:id="rId50"/>
+    <p:sldId id="305" r:id="rId51"/>
+    <p:sldId id="306" r:id="rId52"/>
   </p:sldIdLst>
   <p:sldSz cx="9144000" cy="5143500" type="screen16x9"/>
   <p:notesSz cx="6858000" cy="9144000"/>
@@ -1245,6 +1249,48 @@
               <a:t>Speaker notes</a:t>
             </a:r>
           </a:p>
+          <a:p>
+            <a:pPr lvl="0" indent="0" marL="0">
+              <a:buNone/>
+            </a:pPr>
+          </a:p>
+          <a:p>
+            <a:pPr lvl="0" indent="0" marL="0">
+              <a:buNone/>
+            </a:pPr>
+            <a:r>
+              <a:rPr/>
+              <a:t>Here’s a cartoon image of Professor Mean. I know this looks like it was drawn by a professional artist, but it was actually drawn by me. Really!</a:t>
+            </a:r>
+          </a:p>
+          <a:p>
+            <a:pPr lvl="0" indent="0" marL="0">
+              <a:buNone/>
+            </a:pPr>
+          </a:p>
+          <a:p>
+            <a:pPr lvl="0" indent="0" marL="0">
+              <a:buNone/>
+            </a:pPr>
+            <a:r>
+              <a:rPr/>
+              <a:t>Professor Mean is my alter ego on the Internet. For those who don’t get the inside joke, I point out that Professor Mean is not just your average professor.</a:t>
+            </a:r>
+          </a:p>
+          <a:p>
+            <a:pPr lvl="0" indent="0" marL="0">
+              <a:buNone/>
+            </a:pPr>
+          </a:p>
+          <a:p>
+            <a:pPr lvl="0" indent="0" marL="0">
+              <a:buNone/>
+            </a:pPr>
+            <a:r>
+              <a:rPr/>
+              <a:t>I will use the terms mean and average interchangeably througout this talk.</a:t>
+            </a:r>
+          </a:p>
         </p:txBody>
       </p:sp>
       <p:sp>
@@ -1327,6 +1373,34 @@
               <a:t>Speaker notes</a:t>
             </a:r>
           </a:p>
+          <a:p>
+            <a:pPr lvl="0" indent="0" marL="0">
+              <a:buNone/>
+            </a:pPr>
+          </a:p>
+          <a:p>
+            <a:pPr lvl="0" indent="0" marL="0">
+              <a:buNone/>
+            </a:pPr>
+            <a:r>
+              <a:rPr/>
+              <a:t>This is an image of a traffic median. This is a strip of land, typically raised from the road surface, that splits the road in half.</a:t>
+            </a:r>
+          </a:p>
+          <a:p>
+            <a:pPr lvl="0" indent="0" marL="0">
+              <a:buNone/>
+            </a:pPr>
+          </a:p>
+          <a:p>
+            <a:pPr lvl="0" indent="0" marL="0">
+              <a:buNone/>
+            </a:pPr>
+            <a:r>
+              <a:rPr/>
+              <a:t>In Statistics, the median is the data value that splits the data in half. Half of the data is smaller than the median and half of the data is larger than the median.</a:t>
+            </a:r>
+          </a:p>
         </p:txBody>
       </p:sp>
       <p:sp>
@@ -1420,21 +1494,35 @@
             </a:pPr>
             <a:r>
               <a:rPr/>
-              <a:t>The calculation of the mean and median are fairly simple. For the mean, you just add up all the values and divide by the sample size.</a:t>
-            </a:r>
-          </a:p>
-          <a:p>
-            <a:pPr lvl="0" indent="0" marL="0">
-              <a:buNone/>
-            </a:pPr>
-          </a:p>
-          <a:p>
-            <a:pPr lvl="0" indent="0" marL="0">
-              <a:buNone/>
-            </a:pPr>
-            <a:r>
-              <a:rPr/>
-              <a:t>For the median, you sort the data and choose the middle value. If the sample size is odd, there will be one middle value. If it is even, there will be two middle values. Just split the difference and go halfway between the two middle values.</a:t>
+              <a:t>You already know how to compute the average. Add up all the values and divide by the sample size.</a:t>
+            </a:r>
+          </a:p>
+          <a:p>
+            <a:pPr lvl="0" indent="0" marL="0">
+              <a:buNone/>
+            </a:pPr>
+          </a:p>
+          <a:p>
+            <a:pPr lvl="0" indent="0" marL="0">
+              <a:buNone/>
+            </a:pPr>
+            <a:r>
+              <a:rPr/>
+              <a:t>The median is also simple. Sort the data and choose the “middle” value. If n is odd, there is one value that is right in the middle. With five data values, the median is the third value of the sorted list. The first and second values are smaller and the fourth and fifth values are larger.</a:t>
+            </a:r>
+          </a:p>
+          <a:p>
+            <a:pPr lvl="0" indent="0" marL="0">
+              <a:buNone/>
+            </a:pPr>
+          </a:p>
+          <a:p>
+            <a:pPr lvl="0" indent="0" marL="0">
+              <a:buNone/>
+            </a:pPr>
+            <a:r>
+              <a:rPr/>
+              <a:t>With an even number, there are two middle values. Go halfway between them. If you have eight data values, the midpoint between the fourth and fifth values splits the data in half. The first through fourth values in the sorted list are smaller and the fifth through eighth values are larger.</a:t>
             </a:r>
           </a:p>
         </p:txBody>
@@ -1530,7 +1618,7 @@
             </a:pPr>
             <a:r>
               <a:rPr/>
-              <a:t>Here’s the data for bacterial counts before remediation. If you add the eight values up, you get 90.6. Divide this by eight to get 11.325. Always round liberally when you are talking about the mean.</a:t>
+              <a:t>Here are the mathematical formulas for the mean and median. I know some people hate formulas, but I love them. With a few symbols and Greek letters, you can express really deep and beautiful ideas. Well these formulas aren’t all that deep.</a:t>
             </a:r>
           </a:p>
         </p:txBody>
@@ -1753,20 +1841,6 @@
               <a:t>Speaker notes</a:t>
             </a:r>
           </a:p>
-          <a:p>
-            <a:pPr lvl="0" indent="0" marL="0">
-              <a:buNone/>
-            </a:pPr>
-          </a:p>
-          <a:p>
-            <a:pPr lvl="0" indent="0" marL="0">
-              <a:buNone/>
-            </a:pPr>
-            <a:r>
-              <a:rPr/>
-              <a:t>Here are the same calculations for the bacterial counts after remediation.</a:t>
-            </a:r>
-          </a:p>
         </p:txBody>
       </p:sp>
       <p:sp>
@@ -1860,7 +1934,21 @@
             </a:pPr>
             <a:r>
               <a:rPr/>
-              <a:t>Here is the data for bacteria counts before remediation. Notice that the data is arranged by room number.</a:t>
+              <a:t>The calculation of the mean and median are fairly simple. For the mean, you just add up all the values and divide by the sample size.</a:t>
+            </a:r>
+          </a:p>
+          <a:p>
+            <a:pPr lvl="0" indent="0" marL="0">
+              <a:buNone/>
+            </a:pPr>
+          </a:p>
+          <a:p>
+            <a:pPr lvl="0" indent="0" marL="0">
+              <a:buNone/>
+            </a:pPr>
+            <a:r>
+              <a:rPr/>
+              <a:t>For the median, you sort the data and choose the middle value. If the sample size is odd, there will be one middle value. If it is even, there will be two middle values. Just split the difference and go halfway between the two middle values.</a:t>
             </a:r>
           </a:p>
         </p:txBody>
@@ -1956,7 +2044,7 @@
             </a:pPr>
             <a:r>
               <a:rPr/>
-              <a:t>The first thing you do is sort the data from the lowest bacteria count to the highest bacteria count.</a:t>
+              <a:t>Here’s the data for bacterial counts before remediation. If you add the eight values up, you get 90.6. Divide this by eight to get 11.325. Always round liberally when you are talking about the mean.</a:t>
             </a:r>
           </a:p>
         </p:txBody>
@@ -2052,7 +2140,7 @@
             </a:pPr>
             <a:r>
               <a:rPr/>
-              <a:t>Then pick out the middle value. If you have an even number of data points, there will be two middle values.</a:t>
+              <a:t>Here are the same calculations for the bacterial counts after remediation.</a:t>
             </a:r>
           </a:p>
         </p:txBody>
@@ -2148,7 +2236,7 @@
             </a:pPr>
             <a:r>
               <a:rPr/>
-              <a:t>If there are two middle values, just average them.</a:t>
+              <a:t>Here is the data for bacteria counts before remediation. Notice that the data is arranged by room number.</a:t>
             </a:r>
           </a:p>
         </p:txBody>
@@ -2244,7 +2332,7 @@
             </a:pPr>
             <a:r>
               <a:rPr/>
-              <a:t>Here is the data for bacteria counts after remediation.</a:t>
+              <a:t>The first thing you do is sort the data from the lowest bacteria count to the highest bacteria count.</a:t>
             </a:r>
           </a:p>
         </p:txBody>
@@ -2340,7 +2428,7 @@
             </a:pPr>
             <a:r>
               <a:rPr/>
-              <a:t>Just like before, you sort the data.</a:t>
+              <a:t>Then pick out the middle value. If you have an even number of data points, there will be two middle values.</a:t>
             </a:r>
           </a:p>
         </p:txBody>
@@ -2436,7 +2524,7 @@
             </a:pPr>
             <a:r>
               <a:rPr/>
-              <a:t>Then pick out the middle value. Here again, there are two middle values.</a:t>
+              <a:t>If there are two middle values, just average them.</a:t>
             </a:r>
           </a:p>
         </p:txBody>
@@ -2532,7 +2620,7 @@
             </a:pPr>
             <a:r>
               <a:rPr/>
-              <a:t>Just average the two middle values.</a:t>
+              <a:t>Here is the data for bacteria counts after remediation.</a:t>
             </a:r>
           </a:p>
         </p:txBody>
@@ -2617,6 +2705,20 @@
               <a:t>Speaker notes</a:t>
             </a:r>
           </a:p>
+          <a:p>
+            <a:pPr lvl="0" indent="0" marL="0">
+              <a:buNone/>
+            </a:pPr>
+          </a:p>
+          <a:p>
+            <a:pPr lvl="0" indent="0" marL="0">
+              <a:buNone/>
+            </a:pPr>
+            <a:r>
+              <a:rPr/>
+              <a:t>Just like before, you sort the data.</a:t>
+            </a:r>
+          </a:p>
         </p:txBody>
       </p:sp>
       <p:sp>
@@ -2778,77 +2880,21 @@
             </a:pPr>
             <a:r>
               <a:rPr/>
-              <a:t>There’s a wonderful cartoon by Dana Fradon that appeared in The New Yorker in 1976. She shows a road going into town and the sign by the side of the road reads “Hillsdale, Founded 1802, Altitude 600, Population 3,700. Total 6,122.” You can’t add these things together.</a:t>
-            </a:r>
-          </a:p>
-          <a:p>
-            <a:pPr lvl="0" indent="0" marL="0">
-              <a:buNone/>
-            </a:pPr>
-          </a:p>
-          <a:p>
-            <a:pPr lvl="0" indent="0" marL="0">
-              <a:buNone/>
-            </a:pPr>
-            <a:r>
-              <a:rPr/>
-              <a:t>It’s similar for means. There was a dataset showing housing prices for homes in Boston and none of the analyses seemed to make sense. The problem in Boston is that a small number of the houses had prices that were out of sync with their other homes. These were historical houses, such as Paul Revere’s house.</a:t>
-            </a:r>
-          </a:p>
-          <a:p>
-            <a:pPr lvl="0" indent="0" marL="0">
-              <a:buNone/>
-            </a:pPr>
-          </a:p>
-          <a:p>
-            <a:pPr lvl="0" indent="0" marL="0">
-              <a:buNone/>
-            </a:pPr>
-            <a:r>
-              <a:rPr/>
-              <a:t>When you are averaging numbers, maybe it’s okay to have a few oranges in with the apples. A mix of apples and oranges is just fruit salad. You shouldn’t have a problem with that.</a:t>
-            </a:r>
-          </a:p>
-          <a:p>
-            <a:pPr lvl="0" indent="0" marL="0">
-              <a:buNone/>
-            </a:pPr>
-          </a:p>
-          <a:p>
-            <a:pPr lvl="0" indent="0" marL="0">
-              <a:buNone/>
-            </a:pPr>
-            <a:r>
-              <a:rPr/>
-              <a:t>When it becomes a problem is when the data are so diverse that it becomes a mix of apples and onions. There are lots of great recipes that mix apples and oranges, but none that mix apples and onions.</a:t>
-            </a:r>
-          </a:p>
-          <a:p>
-            <a:pPr lvl="0" indent="0" marL="0">
-              <a:buNone/>
-            </a:pPr>
-          </a:p>
-          <a:p>
-            <a:pPr lvl="0" indent="0" marL="0">
-              <a:buNone/>
-            </a:pPr>
-            <a:r>
-              <a:rPr/>
-              <a:t>The other problem is that an average may be a reasonable number to represent the majority of patients in your sample, but it may masks some important trends that appear in a minority.</a:t>
-            </a:r>
-          </a:p>
-          <a:p>
-            <a:pPr lvl="0" indent="0" marL="0">
-              <a:buNone/>
-            </a:pPr>
-          </a:p>
-          <a:p>
-            <a:pPr lvl="0" indent="0" marL="0">
-              <a:buNone/>
-            </a:pPr>
-            <a:r>
-              <a:rPr/>
-              <a:t>This is a big problem in a larger context than just the mean or median. There are some very fancy high tech predition models that work very well for most people and the statistics like the mean and median back this up quite nicely. But the prediction models perform terribly for minority groups.</a:t>
+              <a:t>Speaker notes</a:t>
+            </a:r>
+          </a:p>
+          <a:p>
+            <a:pPr lvl="0" indent="0" marL="0">
+              <a:buNone/>
+            </a:pPr>
+          </a:p>
+          <a:p>
+            <a:pPr lvl="0" indent="0" marL="0">
+              <a:buNone/>
+            </a:pPr>
+            <a:r>
+              <a:rPr/>
+              <a:t>Then pick out the middle value. Here again, there are two middle values.</a:t>
             </a:r>
           </a:p>
         </p:txBody>
@@ -2944,49 +2990,7 @@
             </a:pPr>
             <a:r>
               <a:rPr/>
-              <a:t>Stephen Jay Gould was a famous Evolutionary Biologist. He was a prolific writer with 20 books and 300 essays. Much of his writing was for academic researchers, but just as much was for the general public.</a:t>
-            </a:r>
-          </a:p>
-          <a:p>
-            <a:pPr lvl="0" indent="0" marL="0">
-              <a:buNone/>
-            </a:pPr>
-          </a:p>
-          <a:p>
-            <a:pPr lvl="0" indent="0" marL="0">
-              <a:buNone/>
-            </a:pPr>
-            <a:r>
-              <a:rPr/>
-              <a:t>One of his most famous essays was “The Median Isn’t the Message”. The title is a take-off of a quote by Marshall McLuhan, “The medium is the message” which itself has an interesting history that you should investigate on your own.</a:t>
-            </a:r>
-          </a:p>
-          <a:p>
-            <a:pPr lvl="0" indent="0" marL="0">
-              <a:buNone/>
-            </a:pPr>
-          </a:p>
-          <a:p>
-            <a:pPr lvl="0" indent="0" marL="0">
-              <a:buNone/>
-            </a:pPr>
-            <a:r>
-              <a:rPr/>
-              <a:t>The Gould essay was written in 1985 for Discover Magazine. It has been reprinted many times, and you can easily find the full text with a simple Google search.</a:t>
-            </a:r>
-          </a:p>
-          <a:p>
-            <a:pPr lvl="0" indent="0" marL="0">
-              <a:buNone/>
-            </a:pPr>
-          </a:p>
-          <a:p>
-            <a:pPr lvl="0" indent="0" marL="0">
-              <a:buNone/>
-            </a:pPr>
-            <a:r>
-              <a:rPr/>
-              <a:t>The image shown here is taken from phoenix5.org, an informational site for patients with prostate cancer.</a:t>
+              <a:t>Just average the two middle values.</a:t>
             </a:r>
           </a:p>
         </p:txBody>
@@ -3008,7 +3012,7 @@
           <a:p>
             <a:fld id="{18BDFEC3-8487-43E8-A154-7C12CBC1FFF2}" type="slidenum">
               <a:rPr lang="en-US"/>
-              <a:t>35</a:t>
+              <a:t>34</a:t>
             </a:fld>
             <a:endParaRPr lang="en-US"/>
           </a:p>
@@ -3090,7 +3094,7 @@
           <a:p>
             <a:fld id="{18BDFEC3-8487-43E8-A154-7C12CBC1FFF2}" type="slidenum">
               <a:rPr lang="en-US"/>
-              <a:t>36</a:t>
+              <a:t>35</a:t>
             </a:fld>
             <a:endParaRPr lang="en-US"/>
           </a:p>
@@ -3150,7 +3154,77 @@
             </a:pPr>
             <a:r>
               <a:rPr/>
-              <a:t>Speaker notes</a:t>
+              <a:t>There’s a wonderful cartoon by Dana Fradon that appeared in The New Yorker in 1976. She shows a road going into town and the sign by the side of the road reads “Hillsdale, Founded 1802, Altitude 600, Population 3,700. Total 6,122.” You can’t add these things together.</a:t>
+            </a:r>
+          </a:p>
+          <a:p>
+            <a:pPr lvl="0" indent="0" marL="0">
+              <a:buNone/>
+            </a:pPr>
+          </a:p>
+          <a:p>
+            <a:pPr lvl="0" indent="0" marL="0">
+              <a:buNone/>
+            </a:pPr>
+            <a:r>
+              <a:rPr/>
+              <a:t>It’s similar for means. There was a dataset showing housing prices for homes in Boston and none of the analyses seemed to make sense. The problem in Boston is that a small number of the houses had prices that were out of sync with their other homes. These were historical houses, such as Paul Revere’s house.</a:t>
+            </a:r>
+          </a:p>
+          <a:p>
+            <a:pPr lvl="0" indent="0" marL="0">
+              <a:buNone/>
+            </a:pPr>
+          </a:p>
+          <a:p>
+            <a:pPr lvl="0" indent="0" marL="0">
+              <a:buNone/>
+            </a:pPr>
+            <a:r>
+              <a:rPr/>
+              <a:t>When you are averaging numbers, maybe it’s okay to have a few oranges in with the apples. A mix of apples and oranges is just fruit salad. You shouldn’t have a problem with that.</a:t>
+            </a:r>
+          </a:p>
+          <a:p>
+            <a:pPr lvl="0" indent="0" marL="0">
+              <a:buNone/>
+            </a:pPr>
+          </a:p>
+          <a:p>
+            <a:pPr lvl="0" indent="0" marL="0">
+              <a:buNone/>
+            </a:pPr>
+            <a:r>
+              <a:rPr/>
+              <a:t>When it becomes a problem is when the data are so diverse that it becomes a mix of apples and onions. There are lots of great recipes that mix apples and oranges, but none that mix apples and onions.</a:t>
+            </a:r>
+          </a:p>
+          <a:p>
+            <a:pPr lvl="0" indent="0" marL="0">
+              <a:buNone/>
+            </a:pPr>
+          </a:p>
+          <a:p>
+            <a:pPr lvl="0" indent="0" marL="0">
+              <a:buNone/>
+            </a:pPr>
+            <a:r>
+              <a:rPr/>
+              <a:t>The other problem is that an average may be a reasonable number to represent the majority of patients in your sample, but it may masks some important trends that appear in a minority.</a:t>
+            </a:r>
+          </a:p>
+          <a:p>
+            <a:pPr lvl="0" indent="0" marL="0">
+              <a:buNone/>
+            </a:pPr>
+          </a:p>
+          <a:p>
+            <a:pPr lvl="0" indent="0" marL="0">
+              <a:buNone/>
+            </a:pPr>
+            <a:r>
+              <a:rPr/>
+              <a:t>This is a big problem in a larger context than just the mean or median. There are some very fancy high tech predition models that work very well for most people and the statistics like the mean and median back this up quite nicely. But the prediction models perform terribly for minority groups.</a:t>
             </a:r>
           </a:p>
         </p:txBody>
@@ -3172,7 +3246,7 @@
           <a:p>
             <a:fld id="{18BDFEC3-8487-43E8-A154-7C12CBC1FFF2}" type="slidenum">
               <a:rPr lang="en-US"/>
-              <a:t>37</a:t>
+              <a:t>36</a:t>
             </a:fld>
             <a:endParaRPr lang="en-US"/>
           </a:p>
@@ -3235,6 +3309,62 @@
               <a:t>Speaker notes</a:t>
             </a:r>
           </a:p>
+          <a:p>
+            <a:pPr lvl="0" indent="0" marL="0">
+              <a:buNone/>
+            </a:pPr>
+          </a:p>
+          <a:p>
+            <a:pPr lvl="0" indent="0" marL="0">
+              <a:buNone/>
+            </a:pPr>
+            <a:r>
+              <a:rPr/>
+              <a:t>Stephen Jay Gould was a famous Evolutionary Biologist. He was a prolific writer with 20 books and 300 essays. Much of his writing was for academic researchers, but just as much was for the general public.</a:t>
+            </a:r>
+          </a:p>
+          <a:p>
+            <a:pPr lvl="0" indent="0" marL="0">
+              <a:buNone/>
+            </a:pPr>
+          </a:p>
+          <a:p>
+            <a:pPr lvl="0" indent="0" marL="0">
+              <a:buNone/>
+            </a:pPr>
+            <a:r>
+              <a:rPr/>
+              <a:t>One of his most famous essays was “The Median Isn’t the Message”. The title is a take-off of a quote by Marshall McLuhan, “The medium is the message” which itself has an interesting history that you should investigate on your own.</a:t>
+            </a:r>
+          </a:p>
+          <a:p>
+            <a:pPr lvl="0" indent="0" marL="0">
+              <a:buNone/>
+            </a:pPr>
+          </a:p>
+          <a:p>
+            <a:pPr lvl="0" indent="0" marL="0">
+              <a:buNone/>
+            </a:pPr>
+            <a:r>
+              <a:rPr/>
+              <a:t>The Gould essay was written in 1985 for Discover Magazine. It has been reprinted many times, and you can easily find the full text with a simple Google search.</a:t>
+            </a:r>
+          </a:p>
+          <a:p>
+            <a:pPr lvl="0" indent="0" marL="0">
+              <a:buNone/>
+            </a:pPr>
+          </a:p>
+          <a:p>
+            <a:pPr lvl="0" indent="0" marL="0">
+              <a:buNone/>
+            </a:pPr>
+            <a:r>
+              <a:rPr/>
+              <a:t>The image shown here is taken from phoenix5.org, an informational site for patients with prostate cancer.</a:t>
+            </a:r>
+          </a:p>
         </p:txBody>
       </p:sp>
       <p:sp>
@@ -3563,20 +3693,6 @@
               <a:t>Speaker notes</a:t>
             </a:r>
           </a:p>
-          <a:p>
-            <a:pPr lvl="0" indent="0" marL="0">
-              <a:buNone/>
-            </a:pPr>
-          </a:p>
-          <a:p>
-            <a:pPr lvl="0" indent="0" marL="0">
-              <a:buNone/>
-            </a:pPr>
-            <a:r>
-              <a:rPr/>
-              <a:t>This cover is taken from the Amazon website.</a:t>
-            </a:r>
-          </a:p>
         </p:txBody>
       </p:sp>
       <p:sp>
@@ -3659,34 +3775,6 @@
               <a:t>Speaker notes</a:t>
             </a:r>
           </a:p>
-          <a:p>
-            <a:pPr lvl="0" indent="0" marL="0">
-              <a:buNone/>
-            </a:pPr>
-          </a:p>
-          <a:p>
-            <a:pPr lvl="0" indent="0" marL="0">
-              <a:buNone/>
-            </a:pPr>
-            <a:r>
-              <a:rPr/>
-              <a:t>First edition, 2001. Second edition, 2012.</a:t>
-            </a:r>
-          </a:p>
-          <a:p>
-            <a:pPr lvl="0" indent="0" marL="0">
-              <a:buNone/>
-            </a:pPr>
-          </a:p>
-          <a:p>
-            <a:pPr lvl="0" indent="0" marL="0">
-              <a:buNone/>
-            </a:pPr>
-            <a:r>
-              <a:rPr/>
-              <a:t>Image taken from Amazon website.</a:t>
-            </a:r>
-          </a:p>
         </p:txBody>
       </p:sp>
       <p:sp>
@@ -3851,34 +3939,6 @@
               <a:t>Speaker notes</a:t>
             </a:r>
           </a:p>
-          <a:p>
-            <a:pPr lvl="0" indent="0" marL="0">
-              <a:buNone/>
-            </a:pPr>
-          </a:p>
-          <a:p>
-            <a:pPr lvl="0" indent="0" marL="0">
-              <a:buNone/>
-            </a:pPr>
-            <a:r>
-              <a:rPr/>
-              <a:t>First edition, 2016.</a:t>
-            </a:r>
-          </a:p>
-          <a:p>
-            <a:pPr lvl="0" indent="0" marL="0">
-              <a:buNone/>
-            </a:pPr>
-          </a:p>
-          <a:p>
-            <a:pPr lvl="0" indent="0" marL="0">
-              <a:buNone/>
-            </a:pPr>
-            <a:r>
-              <a:rPr/>
-              <a:t>Image taken from Amazon website.</a:t>
-            </a:r>
-          </a:p>
         </p:txBody>
       </p:sp>
       <p:sp>
@@ -3899,6 +3959,322 @@
             <a:fld id="{18BDFEC3-8487-43E8-A154-7C12CBC1FFF2}" type="slidenum">
               <a:rPr lang="en-US"/>
               <a:t>44</a:t>
+            </a:fld>
+            <a:endParaRPr lang="en-US"/>
+          </a:p>
+        </p:txBody>
+      </p:sp>
+    </p:spTree>
+  </p:cSld>
+</p:notes>
+</file>
+
+<file path=ppt/notesSlides/notesSlide41.xml><?xml version="1.0" encoding="utf-8"?>
+<p:notes xmlns:a="http://schemas.openxmlformats.org/drawingml/2006/main" xmlns:r="http://schemas.openxmlformats.org/officeDocument/2006/relationships" xmlns:p="http://schemas.openxmlformats.org/presentationml/2006/main">
+  <p:cSld>
+    <p:spTree>
+      <p:nvGrpSpPr>
+        <p:cNvPr id="1" name=""/>
+        <p:cNvGrpSpPr/>
+        <p:nvPr/>
+      </p:nvGrpSpPr>
+      <p:grpSpPr>
+        <a:xfrm>
+          <a:off x="0" y="0"/>
+          <a:ext cx="0" cy="0"/>
+          <a:chOff x="0" y="0"/>
+          <a:chExt cx="0" cy="0"/>
+        </a:xfrm>
+      </p:grpSpPr>
+      <p:sp>
+        <p:nvSpPr>
+          <p:cNvPr id="2" name="Slide Image Placeholder 1"/>
+          <p:cNvSpPr>
+            <a:spLocks noGrp="1" noRot="1" noChangeAspect="1"/>
+          </p:cNvSpPr>
+          <p:nvPr>
+            <p:ph type="sldImg"/>
+          </p:nvPr>
+        </p:nvSpPr>
+        <p:spPr/>
+      </p:sp>
+      <p:sp>
+        <p:nvSpPr>
+          <p:cNvPr id="3" name="Notes Placeholder 2"/>
+          <p:cNvSpPr>
+            <a:spLocks noGrp="1"/>
+          </p:cNvSpPr>
+          <p:nvPr>
+            <p:ph type="body" idx="1"/>
+          </p:nvPr>
+        </p:nvSpPr>
+        <p:spPr/>
+        <p:txBody>
+          <a:bodyPr/>
+          <a:lstStyle/>
+          <a:p>
+            <a:pPr lvl="0" indent="0" marL="0">
+              <a:buNone/>
+            </a:pPr>
+            <a:r>
+              <a:rPr/>
+              <a:t>Speaker notes</a:t>
+            </a:r>
+          </a:p>
+          <a:p>
+            <a:pPr lvl="0" indent="0" marL="0">
+              <a:buNone/>
+            </a:pPr>
+          </a:p>
+          <a:p>
+            <a:pPr lvl="0" indent="0" marL="0">
+              <a:buNone/>
+            </a:pPr>
+            <a:r>
+              <a:rPr/>
+              <a:t>This cover is taken from the Amazon website.</a:t>
+            </a:r>
+          </a:p>
+        </p:txBody>
+      </p:sp>
+      <p:sp>
+        <p:nvSpPr>
+          <p:cNvPr id="4" name="Slide Number Placeholder 3"/>
+          <p:cNvSpPr>
+            <a:spLocks noGrp="1"/>
+          </p:cNvSpPr>
+          <p:nvPr>
+            <p:ph type="sldNum" sz="quarter" idx="10"/>
+          </p:nvPr>
+        </p:nvSpPr>
+        <p:spPr/>
+        <p:txBody>
+          <a:bodyPr/>
+          <a:lstStyle/>
+          <a:p>
+            <a:fld id="{18BDFEC3-8487-43E8-A154-7C12CBC1FFF2}" type="slidenum">
+              <a:rPr lang="en-US"/>
+              <a:t>46</a:t>
+            </a:fld>
+            <a:endParaRPr lang="en-US"/>
+          </a:p>
+        </p:txBody>
+      </p:sp>
+    </p:spTree>
+  </p:cSld>
+</p:notes>
+</file>
+
+<file path=ppt/notesSlides/notesSlide42.xml><?xml version="1.0" encoding="utf-8"?>
+<p:notes xmlns:a="http://schemas.openxmlformats.org/drawingml/2006/main" xmlns:r="http://schemas.openxmlformats.org/officeDocument/2006/relationships" xmlns:p="http://schemas.openxmlformats.org/presentationml/2006/main">
+  <p:cSld>
+    <p:spTree>
+      <p:nvGrpSpPr>
+        <p:cNvPr id="1" name=""/>
+        <p:cNvGrpSpPr/>
+        <p:nvPr/>
+      </p:nvGrpSpPr>
+      <p:grpSpPr>
+        <a:xfrm>
+          <a:off x="0" y="0"/>
+          <a:ext cx="0" cy="0"/>
+          <a:chOff x="0" y="0"/>
+          <a:chExt cx="0" cy="0"/>
+        </a:xfrm>
+      </p:grpSpPr>
+      <p:sp>
+        <p:nvSpPr>
+          <p:cNvPr id="2" name="Slide Image Placeholder 1"/>
+          <p:cNvSpPr>
+            <a:spLocks noGrp="1" noRot="1" noChangeAspect="1"/>
+          </p:cNvSpPr>
+          <p:nvPr>
+            <p:ph type="sldImg"/>
+          </p:nvPr>
+        </p:nvSpPr>
+        <p:spPr/>
+      </p:sp>
+      <p:sp>
+        <p:nvSpPr>
+          <p:cNvPr id="3" name="Notes Placeholder 2"/>
+          <p:cNvSpPr>
+            <a:spLocks noGrp="1"/>
+          </p:cNvSpPr>
+          <p:nvPr>
+            <p:ph type="body" idx="1"/>
+          </p:nvPr>
+        </p:nvSpPr>
+        <p:spPr/>
+        <p:txBody>
+          <a:bodyPr/>
+          <a:lstStyle/>
+          <a:p>
+            <a:pPr lvl="0" indent="0" marL="0">
+              <a:buNone/>
+            </a:pPr>
+            <a:r>
+              <a:rPr/>
+              <a:t>Speaker notes</a:t>
+            </a:r>
+          </a:p>
+          <a:p>
+            <a:pPr lvl="0" indent="0" marL="0">
+              <a:buNone/>
+            </a:pPr>
+          </a:p>
+          <a:p>
+            <a:pPr lvl="0" indent="0" marL="0">
+              <a:buNone/>
+            </a:pPr>
+            <a:r>
+              <a:rPr/>
+              <a:t>First edition, 2001. Second edition, 2012.</a:t>
+            </a:r>
+          </a:p>
+          <a:p>
+            <a:pPr lvl="0" indent="0" marL="0">
+              <a:buNone/>
+            </a:pPr>
+          </a:p>
+          <a:p>
+            <a:pPr lvl="0" indent="0" marL="0">
+              <a:buNone/>
+            </a:pPr>
+            <a:r>
+              <a:rPr/>
+              <a:t>Image taken from Amazon website.</a:t>
+            </a:r>
+          </a:p>
+        </p:txBody>
+      </p:sp>
+      <p:sp>
+        <p:nvSpPr>
+          <p:cNvPr id="4" name="Slide Number Placeholder 3"/>
+          <p:cNvSpPr>
+            <a:spLocks noGrp="1"/>
+          </p:cNvSpPr>
+          <p:nvPr>
+            <p:ph type="sldNum" sz="quarter" idx="10"/>
+          </p:nvPr>
+        </p:nvSpPr>
+        <p:spPr/>
+        <p:txBody>
+          <a:bodyPr/>
+          <a:lstStyle/>
+          <a:p>
+            <a:fld id="{18BDFEC3-8487-43E8-A154-7C12CBC1FFF2}" type="slidenum">
+              <a:rPr lang="en-US"/>
+              <a:t>47</a:t>
+            </a:fld>
+            <a:endParaRPr lang="en-US"/>
+          </a:p>
+        </p:txBody>
+      </p:sp>
+    </p:spTree>
+  </p:cSld>
+</p:notes>
+</file>
+
+<file path=ppt/notesSlides/notesSlide43.xml><?xml version="1.0" encoding="utf-8"?>
+<p:notes xmlns:a="http://schemas.openxmlformats.org/drawingml/2006/main" xmlns:r="http://schemas.openxmlformats.org/officeDocument/2006/relationships" xmlns:p="http://schemas.openxmlformats.org/presentationml/2006/main">
+  <p:cSld>
+    <p:spTree>
+      <p:nvGrpSpPr>
+        <p:cNvPr id="1" name=""/>
+        <p:cNvGrpSpPr/>
+        <p:nvPr/>
+      </p:nvGrpSpPr>
+      <p:grpSpPr>
+        <a:xfrm>
+          <a:off x="0" y="0"/>
+          <a:ext cx="0" cy="0"/>
+          <a:chOff x="0" y="0"/>
+          <a:chExt cx="0" cy="0"/>
+        </a:xfrm>
+      </p:grpSpPr>
+      <p:sp>
+        <p:nvSpPr>
+          <p:cNvPr id="2" name="Slide Image Placeholder 1"/>
+          <p:cNvSpPr>
+            <a:spLocks noGrp="1" noRot="1" noChangeAspect="1"/>
+          </p:cNvSpPr>
+          <p:nvPr>
+            <p:ph type="sldImg"/>
+          </p:nvPr>
+        </p:nvSpPr>
+        <p:spPr/>
+      </p:sp>
+      <p:sp>
+        <p:nvSpPr>
+          <p:cNvPr id="3" name="Notes Placeholder 2"/>
+          <p:cNvSpPr>
+            <a:spLocks noGrp="1"/>
+          </p:cNvSpPr>
+          <p:nvPr>
+            <p:ph type="body" idx="1"/>
+          </p:nvPr>
+        </p:nvSpPr>
+        <p:spPr/>
+        <p:txBody>
+          <a:bodyPr/>
+          <a:lstStyle/>
+          <a:p>
+            <a:pPr lvl="0" indent="0" marL="0">
+              <a:buNone/>
+            </a:pPr>
+            <a:r>
+              <a:rPr/>
+              <a:t>Speaker notes</a:t>
+            </a:r>
+          </a:p>
+          <a:p>
+            <a:pPr lvl="0" indent="0" marL="0">
+              <a:buNone/>
+            </a:pPr>
+          </a:p>
+          <a:p>
+            <a:pPr lvl="0" indent="0" marL="0">
+              <a:buNone/>
+            </a:pPr>
+            <a:r>
+              <a:rPr/>
+              <a:t>First edition, 2016.</a:t>
+            </a:r>
+          </a:p>
+          <a:p>
+            <a:pPr lvl="0" indent="0" marL="0">
+              <a:buNone/>
+            </a:pPr>
+          </a:p>
+          <a:p>
+            <a:pPr lvl="0" indent="0" marL="0">
+              <a:buNone/>
+            </a:pPr>
+            <a:r>
+              <a:rPr/>
+              <a:t>Image taken from Amazon website.</a:t>
+            </a:r>
+          </a:p>
+        </p:txBody>
+      </p:sp>
+      <p:sp>
+        <p:nvSpPr>
+          <p:cNvPr id="4" name="Slide Number Placeholder 3"/>
+          <p:cNvSpPr>
+            <a:spLocks noGrp="1"/>
+          </p:cNvSpPr>
+          <p:nvPr>
+            <p:ph type="sldNum" sz="quarter" idx="10"/>
+          </p:nvPr>
+        </p:nvSpPr>
+        <p:spPr/>
+        <p:txBody>
+          <a:bodyPr/>
+          <a:lstStyle/>
+          <a:p>
+            <a:fld id="{18BDFEC3-8487-43E8-A154-7C12CBC1FFF2}" type="slidenum">
+              <a:rPr lang="en-US"/>
+              <a:t>48</a:t>
             </a:fld>
             <a:endParaRPr lang="en-US"/>
           </a:p>
@@ -7537,7 +7913,7 @@
       </p:sp>
       <p:pic>
         <p:nvPicPr>
-          <p:cNvPr descr="fig:  sperm-count.png" id="0" name="Picture 1"/>
+          <p:cNvPr descr="sperm-count.png" id="0" name="Picture 1"/>
           <p:cNvPicPr>
             <a:picLocks noGrp="1" noChangeAspect="1"/>
           </p:cNvPicPr>
@@ -7644,7 +8020,7 @@
       </p:sp>
       <p:pic>
         <p:nvPicPr>
-          <p:cNvPr descr="fig:  titanic-counts.png" id="0" name="Picture 1"/>
+          <p:cNvPr descr="titanic-counts.png" id="0" name="Picture 1"/>
           <p:cNvPicPr>
             <a:picLocks noGrp="1" noChangeAspect="1"/>
           </p:cNvPicPr>
@@ -7751,7 +8127,7 @@
       </p:sp>
       <p:pic>
         <p:nvPicPr>
-          <p:cNvPr descr="fig:  titanic-column-percents.png" id="0" name="Picture 1"/>
+          <p:cNvPr descr="titanic-column-percents.png" id="0" name="Picture 1"/>
           <p:cNvPicPr>
             <a:picLocks noGrp="1" noChangeAspect="1"/>
           </p:cNvPicPr>
@@ -7858,7 +8234,7 @@
       </p:sp>
       <p:pic>
         <p:nvPicPr>
-          <p:cNvPr descr="fig:  titanic-row-percents.png" id="0" name="Picture 1"/>
+          <p:cNvPr descr="titanic-row-percents.png" id="0" name="Picture 1"/>
           <p:cNvPicPr>
             <a:picLocks noGrp="1" noChangeAspect="1"/>
           </p:cNvPicPr>
@@ -7911,7 +8287,7 @@
             </a:pPr>
             <a:r>
               <a:rPr/>
-              <a:t>Figure 4: Row percentages</a:t>
+              <a:t>Row percentages</a:t>
             </a:r>
           </a:p>
         </p:txBody>
@@ -7965,7 +8341,7 @@
       </p:sp>
       <p:pic>
         <p:nvPicPr>
-          <p:cNvPr descr="fig:  titanic-cell-percents.png" id="0" name="Picture 1"/>
+          <p:cNvPr descr="titanic-cell-percents.png" id="0" name="Picture 1"/>
           <p:cNvPicPr>
             <a:picLocks noGrp="1" noChangeAspect="1"/>
           </p:cNvPicPr>
@@ -8018,7 +8394,7 @@
             </a:pPr>
             <a:r>
               <a:rPr/>
-              <a:t>Figure 5: Cell percentages</a:t>
+              <a:t>Cell percentages</a:t>
             </a:r>
           </a:p>
         </p:txBody>
@@ -8356,7 +8732,7 @@
       </p:grpSpPr>
       <p:pic>
         <p:nvPicPr>
-          <p:cNvPr descr="fig:  titanic-passenger-class-counts.png" id="0" name="Picture 1"/>
+          <p:cNvPr descr="titanic-passenger-class-counts.png" id="0" name="Picture 1"/>
           <p:cNvPicPr>
             <a:picLocks noGrp="1" noChangeAspect="1"/>
           </p:cNvPicPr>
@@ -8409,14 +8785,14 @@
             </a:pPr>
             <a:r>
               <a:rPr/>
-              <a:t>Figure 6: Titanic passenger class counts</a:t>
+              <a:t>Figure 4: Titanic passenger class counts</a:t>
             </a:r>
           </a:p>
         </p:txBody>
       </p:sp>
       <p:pic>
         <p:nvPicPr>
-          <p:cNvPr descr="fig:  titanic-child-counts.png" id="0" name="Picture 1"/>
+          <p:cNvPr descr="titanic-child-counts.png" id="0" name="Picture 1"/>
           <p:cNvPicPr>
             <a:picLocks noGrp="1" noChangeAspect="1"/>
           </p:cNvPicPr>
@@ -8469,7 +8845,7 @@
             </a:pPr>
             <a:r>
               <a:rPr/>
-              <a:t>Figure 7: Titanic child counts</a:t>
+              <a:t>Figure 5: Titanic child counts</a:t>
             </a:r>
           </a:p>
         </p:txBody>
@@ -8516,65 +8892,67 @@
             </a:pPr>
             <a:r>
               <a:rPr/>
-              <a:t>First great controvesy: mean versus median</a:t>
-            </a:r>
-          </a:p>
-        </p:txBody>
-      </p:sp>
-      <p:sp>
-        <p:nvSpPr>
-          <p:cNvPr id="3" name="Content Placeholder 2"/>
-          <p:cNvSpPr>
-            <a:spLocks noGrp="1"/>
-          </p:cNvSpPr>
-          <p:nvPr>
-            <p:ph idx="1"/>
-          </p:nvPr>
-        </p:nvSpPr>
-        <p:spPr/>
-        <p:txBody>
-          <a:bodyPr/>
-          <a:lstStyle/>
-          <a:p>
-            <a:pPr lvl="0"/>
-            <a:r>
-              <a:rPr/>
-              <a:t>Mean</a:t>
-            </a:r>
-          </a:p>
-          <a:p>
-            <a:pPr lvl="1"/>
-            <a:r>
-              <a:rPr/>
-              <a:t>Add up all the values, divide by the sample size</a:t>
-            </a:r>
-          </a:p>
-          <a:p>
-            <a:pPr lvl="1"/>
-            <a:r>
-              <a:rPr/>
-              <a:t>Example</a:t>
-            </a:r>
-          </a:p>
-          <a:p>
-            <a:pPr lvl="0"/>
-            <a:r>
-              <a:rPr/>
-              <a:t>Median</a:t>
-            </a:r>
-          </a:p>
-          <a:p>
-            <a:pPr lvl="1"/>
-            <a:r>
-              <a:rPr/>
-              <a:t>Sort the data, choose the middle value(s)</a:t>
-            </a:r>
-          </a:p>
-          <a:p>
-            <a:pPr lvl="1"/>
-            <a:r>
-              <a:rPr/>
-              <a:t>Example</a:t>
+              <a:t>The mean (average)</a:t>
+            </a:r>
+          </a:p>
+        </p:txBody>
+      </p:sp>
+      <p:pic>
+        <p:nvPicPr>
+          <p:cNvPr descr="professor-mean.png" id="0" name="Picture 1"/>
+          <p:cNvPicPr>
+            <a:picLocks noGrp="1" noChangeAspect="1"/>
+          </p:cNvPicPr>
+          <p:nvPr/>
+        </p:nvPicPr>
+        <p:blipFill>
+          <a:blip r:embed="rId3"/>
+          <a:stretch>
+            <a:fillRect/>
+          </a:stretch>
+        </p:blipFill>
+        <p:spPr bwMode="auto">
+          <a:xfrm>
+            <a:off x="2324100" y="1193800"/>
+            <a:ext cx="4508500" cy="2882900"/>
+          </a:xfrm>
+          <a:prstGeom prst="rect">
+            <a:avLst/>
+          </a:prstGeom>
+          <a:noFill/>
+          <a:ln w="9525">
+            <a:noFill/>
+            <a:headEnd/>
+            <a:tailEnd/>
+          </a:ln>
+        </p:spPr>
+      </p:pic>
+      <p:sp>
+        <p:nvSpPr>
+          <p:cNvPr id="1" name="TextBox 3"/>
+          <p:cNvSpPr txBox="1"/>
+          <p:nvPr/>
+        </p:nvSpPr>
+        <p:spPr>
+          <a:xfrm>
+            <a:off x="457200" y="4076700"/>
+            <a:ext cx="8229600" cy="508000"/>
+          </a:xfrm>
+          <a:prstGeom prst="rect">
+            <a:avLst/>
+          </a:prstGeom>
+          <a:noFill/>
+        </p:spPr>
+        <p:txBody>
+          <a:bodyPr/>
+          <a:lstStyle/>
+          <a:p>
+            <a:pPr lvl="0" indent="0" marL="0" algn="ctr">
+              <a:buNone/>
+            </a:pPr>
+            <a:r>
+              <a:rPr/>
+              <a:t>Figure 6: Cartoon image of Professor Mean</a:t>
             </a:r>
           </a:p>
         </p:txBody>
@@ -8726,42 +9104,67 @@
             </a:pPr>
             <a:r>
               <a:rPr/>
-              <a:t>Bacteria before and after A/C upgrade</a:t>
-            </a:r>
-          </a:p>
-        </p:txBody>
-      </p:sp>
-      <p:sp>
-        <p:nvSpPr>
-          <p:cNvPr id="3" name="Content Placeholder 2"/>
-          <p:cNvSpPr>
-            <a:spLocks noGrp="1"/>
-          </p:cNvSpPr>
-          <p:nvPr>
-            <p:ph idx="1"/>
-          </p:nvPr>
-        </p:nvSpPr>
-        <p:spPr/>
-        <p:txBody>
-          <a:bodyPr/>
-          <a:lstStyle/>
-          <a:p>
-            <a:pPr lvl="0" indent="0">
-              <a:buNone/>
-            </a:pPr>
-            <a:r>
-              <a:rPr>
-                <a:latin typeface="Courier"/>
-              </a:rPr>
-              <a:t>Room Before  After Change
- 121   11.8   10.1   -1.7
- 125    7.1    3.8   -3.3
- 163    8.2    7.2   -1.0
- 218   10.1   10.5    0.4
- 233   10.8    8.3   -2.5
- 264   14     12     -2.0
- 324   14.6   12.1   -2.5
- 325   14     13.7   -0.3  </a:t>
+              <a:t>The median</a:t>
+            </a:r>
+          </a:p>
+        </p:txBody>
+      </p:sp>
+      <p:pic>
+        <p:nvPicPr>
+          <p:cNvPr descr="road-median.jpg" id="0" name="Picture 1"/>
+          <p:cNvPicPr>
+            <a:picLocks noGrp="1" noChangeAspect="1"/>
+          </p:cNvPicPr>
+          <p:nvPr/>
+        </p:nvPicPr>
+        <p:blipFill>
+          <a:blip r:embed="rId3"/>
+          <a:stretch>
+            <a:fillRect/>
+          </a:stretch>
+        </p:blipFill>
+        <p:spPr bwMode="auto">
+          <a:xfrm>
+            <a:off x="2413000" y="1193800"/>
+            <a:ext cx="4318000" cy="2882900"/>
+          </a:xfrm>
+          <a:prstGeom prst="rect">
+            <a:avLst/>
+          </a:prstGeom>
+          <a:noFill/>
+          <a:ln w="9525">
+            <a:noFill/>
+            <a:headEnd/>
+            <a:tailEnd/>
+          </a:ln>
+        </p:spPr>
+      </p:pic>
+      <p:sp>
+        <p:nvSpPr>
+          <p:cNvPr id="1" name="TextBox 3"/>
+          <p:cNvSpPr txBox="1"/>
+          <p:nvPr/>
+        </p:nvSpPr>
+        <p:spPr>
+          <a:xfrm>
+            <a:off x="457200" y="4076700"/>
+            <a:ext cx="8229600" cy="508000"/>
+          </a:xfrm>
+          <a:prstGeom prst="rect">
+            <a:avLst/>
+          </a:prstGeom>
+          <a:noFill/>
+        </p:spPr>
+        <p:txBody>
+          <a:bodyPr/>
+          <a:lstStyle/>
+          <a:p>
+            <a:pPr lvl="0" indent="0" marL="0" algn="ctr">
+              <a:buNone/>
+            </a:pPr>
+            <a:r>
+              <a:rPr/>
+              <a:t>Figure 7: Road with a median strip</a:t>
             </a:r>
           </a:p>
         </p:txBody>
@@ -8838,42 +9241,35 @@
             <a:pPr lvl="1"/>
             <a:r>
               <a:rPr/>
-              <a:t>Add up all the values</a:t>
+              <a:t>Add up all the values, divide by the sample size</a:t>
+            </a:r>
+          </a:p>
+          <a:p>
+            <a:pPr lvl="0"/>
+            <a:r>
+              <a:rPr/>
+              <a:t>Median</a:t>
             </a:r>
           </a:p>
           <a:p>
             <a:pPr lvl="1"/>
             <a:r>
               <a:rPr/>
-              <a:t>Divide by the sample size</a:t>
-            </a:r>
-          </a:p>
-          <a:p>
-            <a:pPr lvl="0"/>
-            <a:r>
-              <a:rPr/>
-              <a:t>Median</a:t>
-            </a:r>
-          </a:p>
-          <a:p>
-            <a:pPr lvl="1"/>
-            <a:r>
-              <a:rPr/>
               <a:t>Sort the data</a:t>
             </a:r>
           </a:p>
           <a:p>
-            <a:pPr lvl="1"/>
-            <a:r>
-              <a:rPr/>
-              <a:t>Select the middle value</a:t>
-            </a:r>
-          </a:p>
-          <a:p>
             <a:pPr lvl="2"/>
             <a:r>
               <a:rPr/>
-              <a:t>go halfway between the two middle values</a:t>
+              <a:t>Select the middle value if n is odd</a:t>
+            </a:r>
+          </a:p>
+          <a:p>
+            <a:pPr lvl="2"/>
+            <a:r>
+              <a:rPr/>
+              <a:t>go halfway between the two middle values if n is even</a:t>
             </a:r>
           </a:p>
         </p:txBody>
@@ -8920,40 +9316,379 @@
             </a:pPr>
             <a:r>
               <a:rPr/>
-              <a:t>Before remediation mean</a:t>
-            </a:r>
-          </a:p>
-        </p:txBody>
-      </p:sp>
-      <p:sp>
-        <p:nvSpPr>
-          <p:cNvPr id="3" name="Content Placeholder 2"/>
-          <p:cNvSpPr>
-            <a:spLocks noGrp="1"/>
-          </p:cNvSpPr>
-          <p:nvPr>
-            <p:ph idx="1"/>
-          </p:nvPr>
-        </p:nvSpPr>
-        <p:spPr/>
-        <p:txBody>
-          <a:bodyPr/>
-          <a:lstStyle/>
-          <a:p>
-            <a:pPr lvl="0" indent="0">
-              <a:buNone/>
-            </a:pPr>
-            <a:r>
-              <a:rPr>
-                <a:latin typeface="Courier"/>
-              </a:rPr>
-              <a:t>11.8 + 7.1 + 8.2 + 10.1 + 10.8 + 14 + 14.6 + 14 = 90.6
-90.6 / 8 = 11.325
-Round to 11.3</a:t>
-            </a:r>
-          </a:p>
-        </p:txBody>
-      </p:sp>
+              <a:t>Formal mathematical definitions</a:t>
+            </a:r>
+          </a:p>
+        </p:txBody>
+      </p:sp>
+      <mc:AlternateContent xmlns:mc="http://schemas.openxmlformats.org/markup-compatibility/2006">
+        <mc:Choice xmlns:a14="http://schemas.microsoft.com/office/drawing/2010/main" Requires="a14">
+          <p:sp>
+            <p:nvSpPr>
+              <p:cNvPr id="3" name="Content Placeholder 2"/>
+              <p:cNvSpPr>
+                <a:spLocks noGrp="1"/>
+              </p:cNvSpPr>
+              <p:nvPr>
+                <p:ph idx="1"/>
+              </p:nvPr>
+            </p:nvSpPr>
+            <p:spPr/>
+            <p:txBody>
+              <a:bodyPr/>
+              <a:lstStyle/>
+              <a:p>
+                <a:pPr lvl="0"/>
+                <a:r>
+                  <a:rPr/>
+                  <a:t>Mean</a:t>
+                </a:r>
+              </a:p>
+              <a:p>
+                <a:pPr lvl="1"/>
+                <a14:m>
+                  <m:oMath xmlns:m="http://schemas.openxmlformats.org/officeDocument/2006/math">
+                    <m:acc>
+                      <m:accPr>
+                        <m:chr m:val="‾"/>
+                      </m:accPr>
+                      <m:e>
+                        <m:r>
+                          <m:t>X</m:t>
+                        </m:r>
+                      </m:e>
+                    </m:acc>
+                    <m:r>
+                      <m:rPr>
+                        <m:sty m:val="p"/>
+                      </m:rPr>
+                      <m:t>=</m:t>
+                    </m:r>
+                    <m:f>
+                      <m:fPr>
+                        <m:type m:val="bar"/>
+                      </m:fPr>
+                      <m:num>
+                        <m:r>
+                          <m:t>1</m:t>
+                        </m:r>
+                      </m:num>
+                      <m:den>
+                        <m:r>
+                          <m:t>n</m:t>
+                        </m:r>
+                      </m:den>
+                    </m:f>
+                    <m:r>
+                      <m:t>Σ</m:t>
+                    </m:r>
+                    <m:sSub>
+                      <m:e>
+                        <m:r>
+                          <m:t>X</m:t>
+                        </m:r>
+                      </m:e>
+                      <m:sub>
+                        <m:r>
+                          <m:t>i</m:t>
+                        </m:r>
+                      </m:sub>
+                    </m:sSub>
+                  </m:oMath>
+                </a14:m>
+              </a:p>
+              <a:p>
+                <a:pPr lvl="0"/>
+                <a:r>
+                  <a:rPr/>
+                  <a:t>Median</a:t>
+                </a:r>
+              </a:p>
+              <a:p>
+                <a:pPr lvl="1"/>
+                <a:r>
+                  <a:rPr/>
+                  <a:t>Sorted values </a:t>
+                </a:r>
+                <a14:m>
+                  <m:oMath xmlns:m="http://schemas.openxmlformats.org/officeDocument/2006/math">
+                    <m:sSub>
+                      <m:e>
+                        <m:r>
+                          <m:t>X</m:t>
+                        </m:r>
+                      </m:e>
+                      <m:sub>
+                        <m:d>
+                          <m:dPr>
+                            <m:begChr m:val="["/>
+                            <m:endChr m:val="]"/>
+                            <m:sepChr m:val=""/>
+                            <m:grow/>
+                          </m:dPr>
+                          <m:e>
+                            <m:r>
+                              <m:t>1</m:t>
+                            </m:r>
+                          </m:e>
+                        </m:d>
+                      </m:sub>
+                    </m:sSub>
+                    <m:r>
+                      <m:rPr>
+                        <m:sty m:val="p"/>
+                      </m:rPr>
+                      <m:t>,</m:t>
+                    </m:r>
+                    <m:sSub>
+                      <m:e>
+                        <m:r>
+                          <m:t>X</m:t>
+                        </m:r>
+                      </m:e>
+                      <m:sub>
+                        <m:d>
+                          <m:dPr>
+                            <m:begChr m:val="["/>
+                            <m:endChr m:val="]"/>
+                            <m:sepChr m:val=""/>
+                            <m:grow/>
+                          </m:dPr>
+                          <m:e>
+                            <m:r>
+                              <m:t>2</m:t>
+                            </m:r>
+                          </m:e>
+                        </m:d>
+                      </m:sub>
+                    </m:sSub>
+                    <m:r>
+                      <m:rPr>
+                        <m:sty m:val="p"/>
+                      </m:rPr>
+                      <m:t>,</m:t>
+                    </m:r>
+                    <m:r>
+                      <m:rPr>
+                        <m:sty m:val="p"/>
+                      </m:rPr>
+                      <m:t>.</m:t>
+                    </m:r>
+                    <m:r>
+                      <m:rPr>
+                        <m:sty m:val="p"/>
+                      </m:rPr>
+                      <m:t>.</m:t>
+                    </m:r>
+                    <m:r>
+                      <m:rPr>
+                        <m:sty m:val="p"/>
+                      </m:rPr>
+                      <m:t>.</m:t>
+                    </m:r>
+                    <m:r>
+                      <m:rPr>
+                        <m:sty m:val="p"/>
+                      </m:rPr>
+                      <m:t>,</m:t>
+                    </m:r>
+                    <m:sSub>
+                      <m:e>
+                        <m:r>
+                          <m:t>X</m:t>
+                        </m:r>
+                      </m:e>
+                      <m:sub>
+                        <m:d>
+                          <m:dPr>
+                            <m:begChr m:val="["/>
+                            <m:endChr m:val="]"/>
+                            <m:sepChr m:val=""/>
+                            <m:grow/>
+                          </m:dPr>
+                          <m:e>
+                            <m:r>
+                              <m:t>n</m:t>
+                            </m:r>
+                          </m:e>
+                        </m:d>
+                      </m:sub>
+                    </m:sSub>
+                  </m:oMath>
+                </a14:m>
+              </a:p>
+              <a:p>
+                <a:pPr lvl="2"/>
+                <a14:m>
+                  <m:oMath xmlns:m="http://schemas.openxmlformats.org/officeDocument/2006/math">
+                    <m:sSub>
+                      <m:e>
+                        <m:r>
+                          <m:t>X</m:t>
+                        </m:r>
+                      </m:e>
+                      <m:sub>
+                        <m:d>
+                          <m:dPr>
+                            <m:begChr m:val="["/>
+                            <m:endChr m:val="]"/>
+                            <m:sepChr m:val=""/>
+                            <m:grow/>
+                          </m:dPr>
+                          <m:e>
+                            <m:d>
+                              <m:dPr>
+                                <m:begChr m:val="("/>
+                                <m:endChr m:val=")"/>
+                                <m:sepChr m:val=""/>
+                                <m:grow/>
+                              </m:dPr>
+                              <m:e>
+                                <m:r>
+                                  <m:t>n</m:t>
+                                </m:r>
+                                <m:r>
+                                  <m:rPr>
+                                    <m:sty m:val="p"/>
+                                  </m:rPr>
+                                  <m:t>+</m:t>
+                                </m:r>
+                                <m:r>
+                                  <m:t>1</m:t>
+                                </m:r>
+                              </m:e>
+                            </m:d>
+                            <m:r>
+                              <m:rPr>
+                                <m:sty m:val="p"/>
+                              </m:rPr>
+                              <m:t>/</m:t>
+                            </m:r>
+                            <m:r>
+                              <m:t>2</m:t>
+                            </m:r>
+                          </m:e>
+                        </m:d>
+                      </m:sub>
+                    </m:sSub>
+                  </m:oMath>
+                </a14:m>
+                <a:r>
+                  <a:rPr/>
+                  <a:t> if n is odd,</a:t>
+                </a:r>
+              </a:p>
+              <a:p>
+                <a:pPr lvl="2"/>
+                <a14:m>
+                  <m:oMath xmlns:m="http://schemas.openxmlformats.org/officeDocument/2006/math">
+                    <m:d>
+                      <m:dPr>
+                        <m:begChr m:val="("/>
+                        <m:endChr m:val=")"/>
+                        <m:sepChr m:val=""/>
+                        <m:grow/>
+                      </m:dPr>
+                      <m:e>
+                        <m:sSub>
+                          <m:e>
+                            <m:r>
+                              <m:t>X</m:t>
+                            </m:r>
+                          </m:e>
+                          <m:sub>
+                            <m:d>
+                              <m:dPr>
+                                <m:begChr m:val="["/>
+                                <m:endChr m:val="]"/>
+                                <m:sepChr m:val=""/>
+                                <m:grow/>
+                              </m:dPr>
+                              <m:e>
+                                <m:r>
+                                  <m:t>n</m:t>
+                                </m:r>
+                                <m:r>
+                                  <m:rPr>
+                                    <m:sty m:val="p"/>
+                                  </m:rPr>
+                                  <m:t>/</m:t>
+                                </m:r>
+                                <m:r>
+                                  <m:t>2</m:t>
+                                </m:r>
+                              </m:e>
+                            </m:d>
+                          </m:sub>
+                        </m:sSub>
+                        <m:r>
+                          <m:rPr>
+                            <m:sty m:val="p"/>
+                          </m:rPr>
+                          <m:t>+</m:t>
+                        </m:r>
+                        <m:sSub>
+                          <m:e>
+                            <m:r>
+                              <m:t>X</m:t>
+                            </m:r>
+                          </m:e>
+                          <m:sub>
+                            <m:d>
+                              <m:dPr>
+                                <m:begChr m:val="["/>
+                                <m:endChr m:val="]"/>
+                                <m:sepChr m:val=""/>
+                                <m:grow/>
+                              </m:dPr>
+                              <m:e>
+                                <m:r>
+                                  <m:t>n</m:t>
+                                </m:r>
+                                <m:r>
+                                  <m:rPr>
+                                    <m:sty m:val="p"/>
+                                  </m:rPr>
+                                  <m:t>/</m:t>
+                                </m:r>
+                                <m:r>
+                                  <m:t>2</m:t>
+                                </m:r>
+                                <m:r>
+                                  <m:rPr>
+                                    <m:sty m:val="p"/>
+                                  </m:rPr>
+                                  <m:t>+</m:t>
+                                </m:r>
+                                <m:r>
+                                  <m:t>1</m:t>
+                                </m:r>
+                              </m:e>
+                            </m:d>
+                          </m:sub>
+                        </m:sSub>
+                      </m:e>
+                    </m:d>
+                    <m:r>
+                      <m:rPr>
+                        <m:sty m:val="p"/>
+                      </m:rPr>
+                      <m:t>/</m:t>
+                    </m:r>
+                    <m:r>
+                      <m:t>2</m:t>
+                    </m:r>
+                  </m:oMath>
+                </a14:m>
+                <a:r>
+                  <a:rPr/>
+                  <a:t> if n is even</a:t>
+                </a:r>
+              </a:p>
+            </p:txBody>
+          </p:sp>
+        </mc:Choice>
+      </mc:AlternateContent>
     </p:spTree>
   </p:cSld>
 </p:sld>
@@ -8996,7 +9731,7 @@
             </a:pPr>
             <a:r>
               <a:rPr/>
-              <a:t>After remediation mean</a:t>
+              <a:t>Bacteria before and after A/C upgrade</a:t>
             </a:r>
           </a:p>
         </p:txBody>
@@ -9023,9 +9758,15 @@
               <a:rPr>
                 <a:latin typeface="Courier"/>
               </a:rPr>
-              <a:t>10.1 + 3.8 + 7.2 + 10.5 + 8.3 + 12 + 12.1 + 13.7 = 77.7
-77.7 / 8 = 9.7125
-Round to 9.7</a:t>
+              <a:t>Room Before  After Change
+ 121   11.8   10.1   -1.7
+ 125    7.1    3.8   -3.3
+ 163    8.2    7.2   -1.0
+ 218   10.1   10.5    0.4
+ 233   10.8    8.3   -2.5
+ 264   14     12     -2.0
+ 324   14.6   12.1   -2.5
+ 325   14     13.7   -0.3  </a:t>
             </a:r>
           </a:p>
         </p:txBody>
@@ -9072,7 +9813,7 @@
             </a:pPr>
             <a:r>
               <a:rPr/>
-              <a:t>Before remediation median (1/4)</a:t>
+              <a:t>Calculation of the mean and median</a:t>
             </a:r>
           </a:p>
         </p:txBody>
@@ -9092,21 +9833,38 @@
           <a:bodyPr/>
           <a:lstStyle/>
           <a:p>
-            <a:pPr lvl="0" indent="0">
-              <a:buNone/>
-            </a:pPr>
-            <a:r>
-              <a:rPr>
-                <a:latin typeface="Courier"/>
-              </a:rPr>
-              <a:t>121  11.8
-125   7.1
-163   8.2
-218  10.1
-233  10.8
-264  14.0
-324  14.6
-325  14.0</a:t>
+            <a:pPr lvl="0"/>
+            <a:r>
+              <a:rPr/>
+              <a:t>Mean</a:t>
+            </a:r>
+          </a:p>
+          <a:p>
+            <a:pPr lvl="1"/>
+            <a:r>
+              <a:rPr/>
+              <a:t>Add up all the values</a:t>
+            </a:r>
+          </a:p>
+          <a:p>
+            <a:pPr lvl="1"/>
+            <a:r>
+              <a:rPr/>
+              <a:t>Divide by the sample size</a:t>
+            </a:r>
+          </a:p>
+          <a:p>
+            <a:pPr lvl="0"/>
+            <a:r>
+              <a:rPr/>
+              <a:t>Median</a:t>
+            </a:r>
+          </a:p>
+          <a:p>
+            <a:pPr lvl="1"/>
+            <a:r>
+              <a:rPr/>
+              <a:t>Sort the data</a:t>
             </a:r>
           </a:p>
         </p:txBody>
@@ -9153,7 +9911,7 @@
             </a:pPr>
             <a:r>
               <a:rPr/>
-              <a:t>Before remediation median (2/4)</a:t>
+              <a:t>Before remediation mean</a:t>
             </a:r>
           </a:p>
         </p:txBody>
@@ -9180,14 +9938,9 @@
               <a:rPr>
                 <a:latin typeface="Courier"/>
               </a:rPr>
-              <a:t>125   7.1
-163   8.2
-218  10.1
-233  10.8
-121  11.8
-264  14.0
-325  14.0
-324  14.6</a:t>
+              <a:t>11.8 + 7.1 + 8.2 + 10.1 + 10.8 + 14 + 14.6 + 14 = 90.6
+90.6 / 8 = 11.325
+Round to 11.3</a:t>
             </a:r>
           </a:p>
         </p:txBody>
@@ -9234,7 +9987,7 @@
             </a:pPr>
             <a:r>
               <a:rPr/>
-              <a:t>Before remediation median (3/4)</a:t>
+              <a:t>After remediation mean</a:t>
             </a:r>
           </a:p>
         </p:txBody>
@@ -9261,14 +10014,9 @@
               <a:rPr>
                 <a:latin typeface="Courier"/>
               </a:rPr>
-              <a:t>125   7.1  
-163   8.2  
-218  10.1  
-233  10.8  10.8
-121  11.8  11.8
-264  14.0  
-325  14.0  
-324  14.6  </a:t>
+              <a:t>10.1 + 3.8 + 7.2 + 10.5 + 8.3 + 12 + 12.1 + 13.7 = 77.7
+77.7 / 8 = 9.7125
+Round to 9.7</a:t>
             </a:r>
           </a:p>
         </p:txBody>
@@ -9315,7 +10063,7 @@
             </a:pPr>
             <a:r>
               <a:rPr/>
-              <a:t>Before remediation median (4/4)</a:t>
+              <a:t>Before remediation median (1/4)</a:t>
             </a:r>
           </a:p>
         </p:txBody>
@@ -9342,15 +10090,14 @@
               <a:rPr>
                 <a:latin typeface="Courier"/>
               </a:rPr>
-              <a:t>125   7.1  
-163   8.2  
-218  10.1  
-233  10.8  10.8
-                  (10.8 + 11.8) / 2 = 11.3
-121  11.8  11.8
-264  14.0  
-325  14.0  
-324  14.6  </a:t>
+              <a:t>121  11.8
+125   7.1
+163   8.2
+218  10.1
+233  10.8
+264  14.0
+324  14.6
+325  14.0</a:t>
             </a:r>
           </a:p>
         </p:txBody>
@@ -9397,7 +10144,7 @@
             </a:pPr>
             <a:r>
               <a:rPr/>
-              <a:t>After remediation median (1/4)</a:t>
+              <a:t>Before remediation median (2/4)</a:t>
             </a:r>
           </a:p>
         </p:txBody>
@@ -9424,14 +10171,14 @@
               <a:rPr>
                 <a:latin typeface="Courier"/>
               </a:rPr>
-              <a:t>121  10.1
-125   3.8
-163   7.2
-218  10.5
-233   8.3
-264  12.0
-324  12.1
-325  13.7</a:t>
+              <a:t>125   7.1
+163   8.2
+218  10.1
+233  10.8
+121  11.8
+264  14.0
+325  14.0
+324  14.6</a:t>
             </a:r>
           </a:p>
         </p:txBody>
@@ -9478,7 +10225,7 @@
             </a:pPr>
             <a:r>
               <a:rPr/>
-              <a:t>After remediation median (2/4)</a:t>
+              <a:t>Before remediation median (3/4)</a:t>
             </a:r>
           </a:p>
         </p:txBody>
@@ -9505,14 +10252,14 @@
               <a:rPr>
                 <a:latin typeface="Courier"/>
               </a:rPr>
-              <a:t>125   3.8
-163   7.2
-233   8.3
-121  10.1
-218  10.5
-264  12.0
-324  12.1
-325  13.7</a:t>
+              <a:t>125   7.1  
+163   8.2  
+218  10.1  
+233  10.8  10.8
+121  11.8  11.8
+264  14.0  
+325  14.0  
+324  14.6  </a:t>
             </a:r>
           </a:p>
         </p:txBody>
@@ -9606,7 +10353,7 @@
             </a:pPr>
             <a:r>
               <a:rPr/>
-              <a:t>After remediation median (3/4)</a:t>
+              <a:t>Before remediation median (4/4)</a:t>
             </a:r>
           </a:p>
         </p:txBody>
@@ -9633,14 +10380,15 @@
               <a:rPr>
                 <a:latin typeface="Courier"/>
               </a:rPr>
-              <a:t>125   3.8  
-163   7.2  
-233   8.3  
-121  10.1  10.1
-218  10.5  10.5
-264  12.0  
-324  12.1  
-325  13.7  </a:t>
+              <a:t>125   7.1  
+163   8.2  
+218  10.1  
+233  10.8  10.8
+                  (10.8 + 11.8) / 2 = 11.3
+121  11.8  11.8
+264  14.0  
+325  14.0  
+324  14.6  </a:t>
             </a:r>
           </a:p>
         </p:txBody>
@@ -9687,7 +10435,7 @@
             </a:pPr>
             <a:r>
               <a:rPr/>
-              <a:t>After remediation median (4/4)</a:t>
+              <a:t>After remediation median (1/4)</a:t>
             </a:r>
           </a:p>
         </p:txBody>
@@ -9714,15 +10462,14 @@
               <a:rPr>
                 <a:latin typeface="Courier"/>
               </a:rPr>
-              <a:t>125   3.8  
-163   7.2  
-233   8.3  
-121  10.1  10.1
-                  (10.1 + 10.5) / 2 = 10.3
-218  10.5  10.5
-264  12.0  
-324  12.1  
-325  13.7  </a:t>
+              <a:t>121  10.1
+125   3.8
+163   7.2
+218  10.5
+233   8.3
+264  12.0
+324  12.1
+325  13.7</a:t>
             </a:r>
           </a:p>
         </p:txBody>
@@ -9769,7 +10516,7 @@
             </a:pPr>
             <a:r>
               <a:rPr/>
-              <a:t>Choosing between the mean and median</a:t>
+              <a:t>After remediation median (2/4)</a:t>
             </a:r>
           </a:p>
         </p:txBody>
@@ -9789,38 +10536,21 @@
           <a:bodyPr/>
           <a:lstStyle/>
           <a:p>
-            <a:pPr lvl="0"/>
-            <a:r>
-              <a:rPr/>
-              <a:t>When do you use the mean?</a:t>
-            </a:r>
-          </a:p>
-          <a:p>
-            <a:pPr lvl="1"/>
-            <a:r>
-              <a:rPr/>
-              <a:t>When totals are important</a:t>
-            </a:r>
-          </a:p>
-          <a:p>
-            <a:pPr lvl="0"/>
-            <a:r>
-              <a:rPr/>
-              <a:t>When do you use the median</a:t>
-            </a:r>
-          </a:p>
-          <a:p>
-            <a:pPr lvl="1"/>
-            <a:r>
-              <a:rPr/>
-              <a:t>When outliers/skewness might distort your conclusions</a:t>
-            </a:r>
-          </a:p>
-          <a:p>
-            <a:pPr lvl="0"/>
-            <a:r>
-              <a:rPr/>
-              <a:t>Often, either is fine</a:t>
+            <a:pPr lvl="0" indent="0">
+              <a:buNone/>
+            </a:pPr>
+            <a:r>
+              <a:rPr>
+                <a:latin typeface="Courier"/>
+              </a:rPr>
+              <a:t>125   3.8
+163   7.2
+233   8.3
+121  10.1
+218  10.5
+264  12.0
+324  12.1
+325  13.7</a:t>
             </a:r>
           </a:p>
         </p:txBody>
@@ -9867,7 +10597,7 @@
             </a:pPr>
             <a:r>
               <a:rPr/>
-              <a:t>Criticisms of the mean and median</a:t>
+              <a:t>After remediation median (3/4)</a:t>
             </a:r>
           </a:p>
         </p:txBody>
@@ -9887,17 +10617,21 @@
           <a:bodyPr/>
           <a:lstStyle/>
           <a:p>
-            <a:pPr lvl="0"/>
-            <a:r>
-              <a:rPr/>
-              <a:t>Are you combining apples and onions?</a:t>
-            </a:r>
-          </a:p>
-          <a:p>
-            <a:pPr lvl="0"/>
-            <a:r>
-              <a:rPr/>
-              <a:t>Are you ignoring minorities?</a:t>
+            <a:pPr lvl="0" indent="0">
+              <a:buNone/>
+            </a:pPr>
+            <a:r>
+              <a:rPr>
+                <a:latin typeface="Courier"/>
+              </a:rPr>
+              <a:t>125   3.8  
+163   7.2  
+233   8.3  
+121  10.1  10.1
+218  10.5  10.5
+264  12.0  
+324  12.1  
+325  13.7  </a:t>
             </a:r>
           </a:p>
         </p:txBody>
@@ -9944,7 +10678,42 @@
             </a:pPr>
             <a:r>
               <a:rPr/>
-              <a:t>Use of the mean for ordinal data</a:t>
+              <a:t>After remediation median (4/4)</a:t>
+            </a:r>
+          </a:p>
+        </p:txBody>
+      </p:sp>
+      <p:sp>
+        <p:nvSpPr>
+          <p:cNvPr id="3" name="Content Placeholder 2"/>
+          <p:cNvSpPr>
+            <a:spLocks noGrp="1"/>
+          </p:cNvSpPr>
+          <p:nvPr>
+            <p:ph idx="1"/>
+          </p:nvPr>
+        </p:nvSpPr>
+        <p:spPr/>
+        <p:txBody>
+          <a:bodyPr/>
+          <a:lstStyle/>
+          <a:p>
+            <a:pPr lvl="0" indent="0">
+              <a:buNone/>
+            </a:pPr>
+            <a:r>
+              <a:rPr>
+                <a:latin typeface="Courier"/>
+              </a:rPr>
+              <a:t>125   3.8  
+163   7.2  
+233   8.3  
+121  10.1  10.1
+                  (10.1 + 10.5) / 2 = 10.3
+218  10.5  10.5
+264  12.0  
+324  12.1  
+325  13.7  </a:t>
             </a:r>
           </a:p>
         </p:txBody>
@@ -9991,6 +10760,228 @@
             </a:pPr>
             <a:r>
               <a:rPr/>
+              <a:t>Choosing between the mean and median</a:t>
+            </a:r>
+          </a:p>
+        </p:txBody>
+      </p:sp>
+      <p:sp>
+        <p:nvSpPr>
+          <p:cNvPr id="3" name="Content Placeholder 2"/>
+          <p:cNvSpPr>
+            <a:spLocks noGrp="1"/>
+          </p:cNvSpPr>
+          <p:nvPr>
+            <p:ph idx="1"/>
+          </p:nvPr>
+        </p:nvSpPr>
+        <p:spPr/>
+        <p:txBody>
+          <a:bodyPr/>
+          <a:lstStyle/>
+          <a:p>
+            <a:pPr lvl="0"/>
+            <a:r>
+              <a:rPr/>
+              <a:t>When do you use the mean?</a:t>
+            </a:r>
+          </a:p>
+          <a:p>
+            <a:pPr lvl="1"/>
+            <a:r>
+              <a:rPr/>
+              <a:t>When totals are important</a:t>
+            </a:r>
+          </a:p>
+          <a:p>
+            <a:pPr lvl="0"/>
+            <a:r>
+              <a:rPr/>
+              <a:t>When do you use the median</a:t>
+            </a:r>
+          </a:p>
+          <a:p>
+            <a:pPr lvl="1"/>
+            <a:r>
+              <a:rPr/>
+              <a:t>When outliers/skewness might distort your conclusions</a:t>
+            </a:r>
+          </a:p>
+          <a:p>
+            <a:pPr lvl="0"/>
+            <a:r>
+              <a:rPr/>
+              <a:t>Often, either is fine</a:t>
+            </a:r>
+          </a:p>
+        </p:txBody>
+      </p:sp>
+    </p:spTree>
+  </p:cSld>
+</p:sld>
+</file>
+
+<file path=ppt/slides/slide36.xml><?xml version="1.0" encoding="utf-8"?>
+<p:sld xmlns:a="http://schemas.openxmlformats.org/drawingml/2006/main" xmlns:r="http://schemas.openxmlformats.org/officeDocument/2006/relationships" xmlns:p="http://schemas.openxmlformats.org/presentationml/2006/main">
+  <p:cSld>
+    <p:spTree>
+      <p:nvGrpSpPr>
+        <p:cNvPr id="1" name=""/>
+        <p:cNvGrpSpPr/>
+        <p:nvPr/>
+      </p:nvGrpSpPr>
+      <p:grpSpPr>
+        <a:xfrm>
+          <a:off x="0" y="0"/>
+          <a:ext cx="0" cy="0"/>
+          <a:chOff x="0" y="0"/>
+          <a:chExt cx="0" cy="0"/>
+        </a:xfrm>
+      </p:grpSpPr>
+      <p:sp>
+        <p:nvSpPr>
+          <p:cNvPr id="2" name="Title 1"/>
+          <p:cNvSpPr>
+            <a:spLocks noGrp="1"/>
+          </p:cNvSpPr>
+          <p:nvPr>
+            <p:ph type="title"/>
+          </p:nvPr>
+        </p:nvSpPr>
+        <p:spPr/>
+        <p:txBody>
+          <a:bodyPr/>
+          <a:lstStyle/>
+          <a:p>
+            <a:pPr lvl="0" indent="0" marL="0">
+              <a:buNone/>
+            </a:pPr>
+            <a:r>
+              <a:rPr/>
+              <a:t>Criticisms of the mean and median</a:t>
+            </a:r>
+          </a:p>
+        </p:txBody>
+      </p:sp>
+      <p:sp>
+        <p:nvSpPr>
+          <p:cNvPr id="3" name="Content Placeholder 2"/>
+          <p:cNvSpPr>
+            <a:spLocks noGrp="1"/>
+          </p:cNvSpPr>
+          <p:nvPr>
+            <p:ph idx="1"/>
+          </p:nvPr>
+        </p:nvSpPr>
+        <p:spPr/>
+        <p:txBody>
+          <a:bodyPr/>
+          <a:lstStyle/>
+          <a:p>
+            <a:pPr lvl="0"/>
+            <a:r>
+              <a:rPr/>
+              <a:t>Are you combining apples and onions?</a:t>
+            </a:r>
+          </a:p>
+          <a:p>
+            <a:pPr lvl="0"/>
+            <a:r>
+              <a:rPr/>
+              <a:t>Are you ignoring minorities?</a:t>
+            </a:r>
+          </a:p>
+        </p:txBody>
+      </p:sp>
+    </p:spTree>
+  </p:cSld>
+</p:sld>
+</file>
+
+<file path=ppt/slides/slide37.xml><?xml version="1.0" encoding="utf-8"?>
+<p:sld xmlns:a="http://schemas.openxmlformats.org/drawingml/2006/main" xmlns:r="http://schemas.openxmlformats.org/officeDocument/2006/relationships" xmlns:p="http://schemas.openxmlformats.org/presentationml/2006/main">
+  <p:cSld>
+    <p:spTree>
+      <p:nvGrpSpPr>
+        <p:cNvPr id="1" name=""/>
+        <p:cNvGrpSpPr/>
+        <p:nvPr/>
+      </p:nvGrpSpPr>
+      <p:grpSpPr>
+        <a:xfrm>
+          <a:off x="0" y="0"/>
+          <a:ext cx="0" cy="0"/>
+          <a:chOff x="0" y="0"/>
+          <a:chExt cx="0" cy="0"/>
+        </a:xfrm>
+      </p:grpSpPr>
+      <p:sp>
+        <p:nvSpPr>
+          <p:cNvPr id="2" name="Title 1"/>
+          <p:cNvSpPr>
+            <a:spLocks noGrp="1"/>
+          </p:cNvSpPr>
+          <p:nvPr>
+            <p:ph type="title"/>
+          </p:nvPr>
+        </p:nvSpPr>
+        <p:spPr/>
+        <p:txBody>
+          <a:bodyPr/>
+          <a:lstStyle/>
+          <a:p>
+            <a:pPr lvl="0" indent="0" marL="0">
+              <a:buNone/>
+            </a:pPr>
+            <a:r>
+              <a:rPr/>
+              <a:t>Use of the mean for ordinal data</a:t>
+            </a:r>
+          </a:p>
+        </p:txBody>
+      </p:sp>
+    </p:spTree>
+  </p:cSld>
+</p:sld>
+</file>
+
+<file path=ppt/slides/slide38.xml><?xml version="1.0" encoding="utf-8"?>
+<p:sld xmlns:a="http://schemas.openxmlformats.org/drawingml/2006/main" xmlns:r="http://schemas.openxmlformats.org/officeDocument/2006/relationships" xmlns:p="http://schemas.openxmlformats.org/presentationml/2006/main">
+  <p:cSld>
+    <p:spTree>
+      <p:nvGrpSpPr>
+        <p:cNvPr id="1" name=""/>
+        <p:cNvGrpSpPr/>
+        <p:nvPr/>
+      </p:nvGrpSpPr>
+      <p:grpSpPr>
+        <a:xfrm>
+          <a:off x="0" y="0"/>
+          <a:ext cx="0" cy="0"/>
+          <a:chOff x="0" y="0"/>
+          <a:chExt cx="0" cy="0"/>
+        </a:xfrm>
+      </p:grpSpPr>
+      <p:sp>
+        <p:nvSpPr>
+          <p:cNvPr id="2" name="Title 1"/>
+          <p:cNvSpPr>
+            <a:spLocks noGrp="1"/>
+          </p:cNvSpPr>
+          <p:nvPr>
+            <p:ph type="title"/>
+          </p:nvPr>
+        </p:nvSpPr>
+        <p:spPr/>
+        <p:txBody>
+          <a:bodyPr/>
+          <a:lstStyle/>
+          <a:p>
+            <a:pPr lvl="0" indent="0" marL="0">
+              <a:buNone/>
+            </a:pPr>
+            <a:r>
+              <a:rPr/>
               <a:t>Gould 1985</a:t>
             </a:r>
           </a:p>
@@ -9998,7 +10989,7 @@
       </p:sp>
       <p:pic>
         <p:nvPicPr>
-          <p:cNvPr descr="fig:  gould-1985.png" id="0" name="Picture 1"/>
+          <p:cNvPr descr="gould-1985.png" id="0" name="Picture 1"/>
           <p:cNvPicPr>
             <a:picLocks noGrp="1" noChangeAspect="1"/>
           </p:cNvPicPr>
@@ -10061,7 +11052,7 @@
 </p:sld>
 </file>
 
-<file path=ppt/slides/slide36.xml><?xml version="1.0" encoding="utf-8"?>
+<file path=ppt/slides/slide39.xml><?xml version="1.0" encoding="utf-8"?>
 <p:sld xmlns:a="http://schemas.openxmlformats.org/drawingml/2006/main" xmlns:r="http://schemas.openxmlformats.org/officeDocument/2006/relationships" xmlns:p="http://schemas.openxmlformats.org/presentationml/2006/main">
   <p:cSld>
     <p:spTree>
@@ -10105,7 +11096,7 @@
       </p:sp>
       <p:pic>
         <p:nvPicPr>
-          <p:cNvPr descr="fig:  bridge-2001.png" id="0" name="Picture 1"/>
+          <p:cNvPr descr="bridge-2001.png" id="0" name="Picture 1"/>
           <p:cNvPicPr>
             <a:picLocks noGrp="1" noChangeAspect="1"/>
           </p:cNvPicPr>
@@ -10168,7 +11159,7 @@
 </p:sld>
 </file>
 
-<file path=ppt/slides/slide37.xml><?xml version="1.0" encoding="utf-8"?>
+<file path=ppt/slides/slide4.xml><?xml version="1.0" encoding="utf-8"?>
 <p:sld xmlns:a="http://schemas.openxmlformats.org/drawingml/2006/main" xmlns:r="http://schemas.openxmlformats.org/officeDocument/2006/relationships" xmlns:p="http://schemas.openxmlformats.org/presentationml/2006/main">
   <p:cSld>
     <p:spTree>
@@ -10205,7 +11196,7 @@
             </a:pPr>
             <a:r>
               <a:rPr/>
-              <a:t>Bridge 2001, PMID: 11405531 (continued)</a:t>
+              <a:t>A bit more about myself</a:t>
             </a:r>
           </a:p>
         </p:txBody>
@@ -10225,16 +11216,52 @@
           <a:bodyPr/>
           <a:lstStyle/>
           <a:p>
-            <a:pPr lvl="0" indent="0" marL="0">
-              <a:buNone/>
-            </a:pPr>
-            <a:r>
-              <a:rPr/>
-              <a:t>The measurement of airway resistance by the interrupter technique (Rint) needs standardization. Should measurements be made be during the expiratory or inspiratory phase of tidal breathing? </a:t>
-            </a:r>
-            <a:r>
-              <a:rPr b="1"/>
-              <a:t>In reported studies, the measurement of Rint has been calculated as the median or mean of a small number of values, is there an important difference?</a:t>
+            <a:pPr lvl="0"/>
+            <a:r>
+              <a:rPr/>
+              <a:t>PhD in Statistics in 1982 from the University of Iowa</a:t>
+            </a:r>
+          </a:p>
+          <a:p>
+            <a:pPr lvl="0"/>
+            <a:r>
+              <a:rPr/>
+              <a:t>Currently full professor</a:t>
+            </a:r>
+          </a:p>
+          <a:p>
+            <a:pPr lvl="0"/>
+            <a:r>
+              <a:rPr/>
+              <a:t>Part-time statistical consultant</a:t>
+            </a:r>
+          </a:p>
+          <a:p>
+            <a:pPr lvl="0"/>
+            <a:r>
+              <a:rPr/>
+              <a:t>Funded on 18 research grants</a:t>
+            </a:r>
+          </a:p>
+          <a:p>
+            <a:pPr lvl="0"/>
+            <a:r>
+              <a:rPr/>
+              <a:t>Over 100 peer-reviewed publications</a:t>
+            </a:r>
+          </a:p>
+          <a:p>
+            <a:pPr lvl="0"/>
+            <a:r>
+              <a:rPr/>
+              <a:t>Website with over 2,000 pages</a:t>
+            </a:r>
+          </a:p>
+          <a:p>
+            <a:pPr lvl="0"/>
+            <a:r>
+              <a:rPr/>
+              <a:t>Many invitations to talk at conferences</a:t>
             </a:r>
           </a:p>
         </p:txBody>
@@ -10244,7 +11271,7 @@
 </p:sld>
 </file>
 
-<file path=ppt/slides/slide38.xml><?xml version="1.0" encoding="utf-8"?>
+<file path=ppt/slides/slide40.xml><?xml version="1.0" encoding="utf-8"?>
 <p:sld xmlns:a="http://schemas.openxmlformats.org/drawingml/2006/main" xmlns:r="http://schemas.openxmlformats.org/officeDocument/2006/relationships" xmlns:p="http://schemas.openxmlformats.org/presentationml/2006/main">
   <p:cSld>
     <p:spTree>
@@ -10306,20 +11333,11 @@
             </a:pPr>
             <a:r>
               <a:rPr/>
-              <a:t>In the present data the mean of a set of values contributing to a measurement was not significantly different from the median. </a:t>
+              <a:t>The measurement of airway resistance by the interrupter technique (Rint) needs standardization. Should measurements be made be during the expiratory or inspiratory phase of tidal breathing? </a:t>
             </a:r>
             <a:r>
               <a:rPr b="1"/>
-              <a:t>However, the use of the median has been recommended since it is less affected by possible outlying values such as might be included by fully automated equipment.</a:t>
-            </a:r>
-          </a:p>
-          <a:p>
-            <a:pPr lvl="0" indent="0" marL="0">
-              <a:buNone/>
-            </a:pPr>
-            <a:r>
-              <a:rPr/>
-              <a:t>=======</a:t>
+              <a:t>In reported studies, the measurement of Rint has been calculated as the median or mean of a small number of values, is there an important difference?</a:t>
             </a:r>
           </a:p>
         </p:txBody>
@@ -10329,7 +11347,7 @@
 </p:sld>
 </file>
 
-<file path=ppt/slides/slide39.xml><?xml version="1.0" encoding="utf-8"?>
+<file path=ppt/slides/slide41.xml><?xml version="1.0" encoding="utf-8"?>
 <p:sld xmlns:a="http://schemas.openxmlformats.org/drawingml/2006/main" xmlns:r="http://schemas.openxmlformats.org/officeDocument/2006/relationships" xmlns:p="http://schemas.openxmlformats.org/presentationml/2006/main">
   <p:cSld>
     <p:spTree>
@@ -10366,6 +11384,82 @@
             </a:pPr>
             <a:r>
               <a:rPr/>
+              <a:t>Bridge 2001, PMID: 11405531 (continued)</a:t>
+            </a:r>
+          </a:p>
+        </p:txBody>
+      </p:sp>
+      <p:sp>
+        <p:nvSpPr>
+          <p:cNvPr id="3" name="Content Placeholder 2"/>
+          <p:cNvSpPr>
+            <a:spLocks noGrp="1"/>
+          </p:cNvSpPr>
+          <p:nvPr>
+            <p:ph idx="1"/>
+          </p:nvPr>
+        </p:nvSpPr>
+        <p:spPr/>
+        <p:txBody>
+          <a:bodyPr/>
+          <a:lstStyle/>
+          <a:p>
+            <a:pPr lvl="0" indent="0" marL="0">
+              <a:buNone/>
+            </a:pPr>
+            <a:r>
+              <a:rPr/>
+              <a:t>In the present data the mean of a set of values contributing to a measurement was not significantly different from the median. </a:t>
+            </a:r>
+            <a:r>
+              <a:rPr b="1"/>
+              <a:t>However, the use of the median has been recommended since it is less affected by possible outlying values such as might be included by fully automated equipment.</a:t>
+            </a:r>
+          </a:p>
+        </p:txBody>
+      </p:sp>
+    </p:spTree>
+  </p:cSld>
+</p:sld>
+</file>
+
+<file path=ppt/slides/slide42.xml><?xml version="1.0" encoding="utf-8"?>
+<p:sld xmlns:a="http://schemas.openxmlformats.org/drawingml/2006/main" xmlns:r="http://schemas.openxmlformats.org/officeDocument/2006/relationships" xmlns:p="http://schemas.openxmlformats.org/presentationml/2006/main">
+  <p:cSld>
+    <p:spTree>
+      <p:nvGrpSpPr>
+        <p:cNvPr id="1" name=""/>
+        <p:cNvGrpSpPr/>
+        <p:nvPr/>
+      </p:nvGrpSpPr>
+      <p:grpSpPr>
+        <a:xfrm>
+          <a:off x="0" y="0"/>
+          <a:ext cx="0" cy="0"/>
+          <a:chOff x="0" y="0"/>
+          <a:chExt cx="0" cy="0"/>
+        </a:xfrm>
+      </p:grpSpPr>
+      <p:sp>
+        <p:nvSpPr>
+          <p:cNvPr id="2" name="Title 1"/>
+          <p:cNvSpPr>
+            <a:spLocks noGrp="1"/>
+          </p:cNvSpPr>
+          <p:nvPr>
+            <p:ph type="title"/>
+          </p:nvPr>
+        </p:nvSpPr>
+        <p:spPr/>
+        <p:txBody>
+          <a:bodyPr/>
+          <a:lstStyle/>
+          <a:p>
+            <a:pPr lvl="0" indent="0" marL="0">
+              <a:buNone/>
+            </a:pPr>
+            <a:r>
+              <a:rPr/>
               <a:t>Chen 2019, PMID: 31806195</a:t>
             </a:r>
           </a:p>
@@ -10373,7 +11467,7 @@
       </p:sp>
       <p:pic>
         <p:nvPicPr>
-          <p:cNvPr descr="fig:  chen-2019.png" id="0" name="Picture 1"/>
+          <p:cNvPr descr="chen-2019.png" id="0" name="Picture 1"/>
           <p:cNvPicPr>
             <a:picLocks noGrp="1" noChangeAspect="1"/>
           </p:cNvPicPr>
@@ -10436,7 +11530,7 @@
 </p:sld>
 </file>
 
-<file path=ppt/slides/slide4.xml><?xml version="1.0" encoding="utf-8"?>
+<file path=ppt/slides/slide43.xml><?xml version="1.0" encoding="utf-8"?>
 <p:sld xmlns:a="http://schemas.openxmlformats.org/drawingml/2006/main" xmlns:r="http://schemas.openxmlformats.org/officeDocument/2006/relationships" xmlns:p="http://schemas.openxmlformats.org/presentationml/2006/main">
   <p:cSld>
     <p:spTree>
@@ -10473,7 +11567,7 @@
             </a:pPr>
             <a:r>
               <a:rPr/>
-              <a:t>A bit more about myself</a:t>
+              <a:t>Chen 2019, PMID: 31806195 (continued)</a:t>
             </a:r>
           </a:p>
         </p:txBody>
@@ -10493,52 +11587,16 @@
           <a:bodyPr/>
           <a:lstStyle/>
           <a:p>
-            <a:pPr lvl="0"/>
-            <a:r>
-              <a:rPr/>
-              <a:t>PhD in Statistics in 1982 from the University of Iowa</a:t>
-            </a:r>
-          </a:p>
-          <a:p>
-            <a:pPr lvl="0"/>
-            <a:r>
-              <a:rPr/>
-              <a:t>Currently full professor</a:t>
-            </a:r>
-          </a:p>
-          <a:p>
-            <a:pPr lvl="0"/>
-            <a:r>
-              <a:rPr/>
-              <a:t>Part-time statistical consultant</a:t>
-            </a:r>
-          </a:p>
-          <a:p>
-            <a:pPr lvl="0"/>
-            <a:r>
-              <a:rPr/>
-              <a:t>Funded on 18 research grants</a:t>
-            </a:r>
-          </a:p>
-          <a:p>
-            <a:pPr lvl="0"/>
-            <a:r>
-              <a:rPr/>
-              <a:t>Over 100 peer-reviewed publications</a:t>
-            </a:r>
-          </a:p>
-          <a:p>
-            <a:pPr lvl="0"/>
-            <a:r>
-              <a:rPr/>
-              <a:t>Website with over 2,000 pages</a:t>
-            </a:r>
-          </a:p>
-          <a:p>
-            <a:pPr lvl="0"/>
-            <a:r>
-              <a:rPr/>
-              <a:t>Many invitations to talk at conferences</a:t>
+            <a:pPr lvl="0" indent="0" marL="0">
+              <a:buNone/>
+            </a:pPr>
+            <a:r>
+              <a:rPr/>
+              <a:t>Background: The prices of newly approved cancer drugs have risen over the past decades. </a:t>
+            </a:r>
+            <a:r>
+              <a:rPr b="1"/>
+              <a:t>A key policy question is whether the clinical gains offered by these drugs in treating specific cancer indications justify the price increases.</a:t>
             </a:r>
           </a:p>
         </p:txBody>
@@ -10548,7 +11606,7 @@
 </p:sld>
 </file>
 
-<file path=ppt/slides/slide40.xml><?xml version="1.0" encoding="utf-8"?>
+<file path=ppt/slides/slide44.xml><?xml version="1.0" encoding="utf-8"?>
 <p:sld xmlns:a="http://schemas.openxmlformats.org/drawingml/2006/main" xmlns:r="http://schemas.openxmlformats.org/officeDocument/2006/relationships" xmlns:p="http://schemas.openxmlformats.org/presentationml/2006/main">
   <p:cSld>
     <p:spTree>
@@ -10610,11 +11668,15 @@
             </a:pPr>
             <a:r>
               <a:rPr/>
-              <a:t>Background: The prices of newly approved cancer drugs have risen over the past decades. </a:t>
+              <a:t>Results: We found that between 1995 and 2012, price increases outstripped median survival gains, a finding consistent with previous literature. </a:t>
             </a:r>
             <a:r>
               <a:rPr b="1"/>
-              <a:t>A key policy question is whether the clinical gains offered by these drugs in treating specific cancer indications justify the price increases.</a:t>
+              <a:t>Nevertheless, price per mean life-year gained increased at a considerably slower rate, suggesting that new drugs have been more effective in achieving longer-term survival.</a:t>
+            </a:r>
+            <a:r>
+              <a:rPr/>
+              <a:t> Between 2013 and 2017, price increases reflected equally large gains in median and mean survival, resulting in a flat profile for benefit-adjusted launch prices in recent years.</a:t>
             </a:r>
           </a:p>
         </p:txBody>
@@ -10624,7 +11686,7 @@
 </p:sld>
 </file>
 
-<file path=ppt/slides/slide41.xml><?xml version="1.0" encoding="utf-8"?>
+<file path=ppt/slides/slide45.xml><?xml version="1.0" encoding="utf-8"?>
 <p:sld xmlns:a="http://schemas.openxmlformats.org/drawingml/2006/main" xmlns:r="http://schemas.openxmlformats.org/officeDocument/2006/relationships" xmlns:p="http://schemas.openxmlformats.org/presentationml/2006/main">
   <p:cSld>
     <p:spTree>
@@ -10661,50 +11723,47 @@
             </a:pPr>
             <a:r>
               <a:rPr/>
-              <a:t>Chen 2019, PMID: 31806195 (continued)</a:t>
-            </a:r>
-          </a:p>
-        </p:txBody>
-      </p:sp>
-      <p:sp>
-        <p:nvSpPr>
-          <p:cNvPr id="3" name="Content Placeholder 2"/>
-          <p:cNvSpPr>
-            <a:spLocks noGrp="1"/>
-          </p:cNvSpPr>
-          <p:nvPr>
-            <p:ph idx="1"/>
-          </p:nvPr>
-        </p:nvSpPr>
-        <p:spPr/>
-        <p:txBody>
-          <a:bodyPr/>
-          <a:lstStyle/>
-          <a:p>
-            <a:pPr lvl="0" indent="0" marL="0">
-              <a:buNone/>
-            </a:pPr>
-            <a:r>
-              <a:rPr/>
-              <a:t>Results: We found that between 1995 and 2012, price increases outstripped median survival gains, a finding consistent with previous literature. </a:t>
-            </a:r>
-            <a:r>
-              <a:rPr b="1"/>
-              <a:t>Nevertheless, price per mean life-year gained increased at a considerably slower rate, suggesting that new drugs have been more effective in achieving longer-term survival.</a:t>
-            </a:r>
-            <a:r>
-              <a:rPr/>
-              <a:t> Between 2013 and 2017, price increases reflected equally large gains in median and mean survival, resulting in a flat profile for benefit-adjusted launch prices in recent years.</a:t>
-            </a:r>
-          </a:p>
-        </p:txBody>
-      </p:sp>
+              <a:t>Percentiles</a:t>
+            </a:r>
+          </a:p>
+        </p:txBody>
+      </p:sp>
+      <p:pic>
+        <p:nvPicPr>
+          <p:cNvPr descr="day-one_files/figure-pptx/unnamed-chunk-11-1.png" id="0" name="Picture 1"/>
+          <p:cNvPicPr>
+            <a:picLocks noGrp="1" noChangeAspect="1"/>
+          </p:cNvPicPr>
+          <p:nvPr/>
+        </p:nvPicPr>
+        <p:blipFill>
+          <a:blip r:embed="rId2"/>
+          <a:stretch>
+            <a:fillRect/>
+          </a:stretch>
+        </p:blipFill>
+        <p:spPr bwMode="auto">
+          <a:xfrm>
+            <a:off x="1181100" y="1193800"/>
+            <a:ext cx="6781800" cy="3390900"/>
+          </a:xfrm>
+          <a:prstGeom prst="rect">
+            <a:avLst/>
+          </a:prstGeom>
+          <a:noFill/>
+          <a:ln w="9525">
+            <a:noFill/>
+            <a:headEnd/>
+            <a:tailEnd/>
+          </a:ln>
+        </p:spPr>
+      </p:pic>
     </p:spTree>
   </p:cSld>
 </p:sld>
 </file>
 
-<file path=ppt/slides/slide42.xml><?xml version="1.0" encoding="utf-8"?>
+<file path=ppt/slides/slide46.xml><?xml version="1.0" encoding="utf-8"?>
 <p:sld xmlns:a="http://schemas.openxmlformats.org/drawingml/2006/main" xmlns:r="http://schemas.openxmlformats.org/officeDocument/2006/relationships" xmlns:p="http://schemas.openxmlformats.org/presentationml/2006/main">
   <p:cSld>
     <p:spTree>
@@ -10748,7 +11807,7 @@
       </p:sp>
       <p:pic>
         <p:nvPicPr>
-          <p:cNvPr descr="fig:  gould-2006.jpg" id="0" name="Picture 1"/>
+          <p:cNvPr descr="gould-2006.jpg" id="0" name="Picture 1"/>
           <p:cNvPicPr>
             <a:picLocks noGrp="1" noChangeAspect="1"/>
           </p:cNvPicPr>
@@ -10811,7 +11870,7 @@
 </p:sld>
 </file>
 
-<file path=ppt/slides/slide43.xml><?xml version="1.0" encoding="utf-8"?>
+<file path=ppt/slides/slide47.xml><?xml version="1.0" encoding="utf-8"?>
 <p:sld xmlns:a="http://schemas.openxmlformats.org/drawingml/2006/main" xmlns:r="http://schemas.openxmlformats.org/officeDocument/2006/relationships" xmlns:p="http://schemas.openxmlformats.org/presentationml/2006/main">
   <p:cSld>
     <p:spTree>
@@ -10855,7 +11914,7 @@
       </p:sp>
       <p:pic>
         <p:nvPicPr>
-          <p:cNvPr descr="fig:  best-2012.jpg" id="0" name="Picture 1"/>
+          <p:cNvPr descr="best-2012.jpg" id="0" name="Picture 1"/>
           <p:cNvPicPr>
             <a:picLocks noGrp="1" noChangeAspect="1"/>
           </p:cNvPicPr>
@@ -10918,7 +11977,7 @@
 </p:sld>
 </file>
 
-<file path=ppt/slides/slide44.xml><?xml version="1.0" encoding="utf-8"?>
+<file path=ppt/slides/slide48.xml><?xml version="1.0" encoding="utf-8"?>
 <p:sld xmlns:a="http://schemas.openxmlformats.org/drawingml/2006/main" xmlns:r="http://schemas.openxmlformats.org/officeDocument/2006/relationships" xmlns:p="http://schemas.openxmlformats.org/presentationml/2006/main">
   <p:cSld>
     <p:spTree>
@@ -10962,7 +12021,7 @@
       </p:sp>
       <p:pic>
         <p:nvPicPr>
-          <p:cNvPr descr="fig:  oneil-2016.jpg" id="0" name="Picture 1"/>
+          <p:cNvPr descr="oneil-2016.jpg" id="0" name="Picture 1"/>
           <p:cNvPicPr>
             <a:picLocks noGrp="1" noChangeAspect="1"/>
           </p:cNvPicPr>
@@ -11025,7 +12084,7 @@
 </p:sld>
 </file>
 
-<file path=ppt/slides/slide45.xml><?xml version="1.0" encoding="utf-8"?>
+<file path=ppt/slides/slide49.xml><?xml version="1.0" encoding="utf-8"?>
 <p:sld xmlns:a="http://schemas.openxmlformats.org/drawingml/2006/main" xmlns:r="http://schemas.openxmlformats.org/officeDocument/2006/relationships" xmlns:p="http://schemas.openxmlformats.org/presentationml/2006/main">
   <p:cSld>
     <p:spTree>
@@ -11088,150 +12147,6 @@
             <a:r>
               <a:rPr/>
               <a:t>https://www.nytimes.com/2012/02/19/magazine/shopping-habits.html</a:t>
-            </a:r>
-          </a:p>
-        </p:txBody>
-      </p:sp>
-    </p:spTree>
-  </p:cSld>
-</p:sld>
-</file>
-
-<file path=ppt/slides/slide46.xml><?xml version="1.0" encoding="utf-8"?>
-<p:sld xmlns:a="http://schemas.openxmlformats.org/drawingml/2006/main" xmlns:r="http://schemas.openxmlformats.org/officeDocument/2006/relationships" xmlns:p="http://schemas.openxmlformats.org/presentationml/2006/main">
-  <p:cSld>
-    <p:spTree>
-      <p:nvGrpSpPr>
-        <p:cNvPr id="1" name=""/>
-        <p:cNvGrpSpPr/>
-        <p:nvPr/>
-      </p:nvGrpSpPr>
-      <p:grpSpPr>
-        <a:xfrm>
-          <a:off x="0" y="0"/>
-          <a:ext cx="0" cy="0"/>
-          <a:chOff x="0" y="0"/>
-          <a:chExt cx="0" cy="0"/>
-        </a:xfrm>
-      </p:grpSpPr>
-      <p:sp>
-        <p:nvSpPr>
-          <p:cNvPr id="2" name="Title 1"/>
-          <p:cNvSpPr>
-            <a:spLocks noGrp="1"/>
-          </p:cNvSpPr>
-          <p:nvPr>
-            <p:ph type="title"/>
-          </p:nvPr>
-        </p:nvSpPr>
-        <p:spPr/>
-        <p:txBody>
-          <a:bodyPr/>
-          <a:lstStyle/>
-          <a:p>
-            <a:pPr lvl="0" indent="0" marL="0">
-              <a:buNone/>
-            </a:pPr>
-            <a:r>
-              <a:rPr/>
-              <a:t>Machine Bias</a:t>
-            </a:r>
-          </a:p>
-        </p:txBody>
-      </p:sp>
-      <p:sp>
-        <p:nvSpPr>
-          <p:cNvPr id="3" name="Content Placeholder 2"/>
-          <p:cNvSpPr>
-            <a:spLocks noGrp="1"/>
-          </p:cNvSpPr>
-          <p:nvPr>
-            <p:ph idx="1"/>
-          </p:nvPr>
-        </p:nvSpPr>
-        <p:spPr/>
-        <p:txBody>
-          <a:bodyPr/>
-          <a:lstStyle/>
-          <a:p>
-            <a:pPr lvl="0" indent="0" marL="0">
-              <a:buNone/>
-            </a:pPr>
-            <a:r>
-              <a:rPr/>
-              <a:t>https://www.propublica.org/article/machine-bias-risk-assessments-in-criminal-sentencing</a:t>
-            </a:r>
-          </a:p>
-        </p:txBody>
-      </p:sp>
-    </p:spTree>
-  </p:cSld>
-</p:sld>
-</file>
-
-<file path=ppt/slides/slide47.xml><?xml version="1.0" encoding="utf-8"?>
-<p:sld xmlns:a="http://schemas.openxmlformats.org/drawingml/2006/main" xmlns:r="http://schemas.openxmlformats.org/officeDocument/2006/relationships" xmlns:p="http://schemas.openxmlformats.org/presentationml/2006/main">
-  <p:cSld>
-    <p:spTree>
-      <p:nvGrpSpPr>
-        <p:cNvPr id="1" name=""/>
-        <p:cNvGrpSpPr/>
-        <p:nvPr/>
-      </p:nvGrpSpPr>
-      <p:grpSpPr>
-        <a:xfrm>
-          <a:off x="0" y="0"/>
-          <a:ext cx="0" cy="0"/>
-          <a:chOff x="0" y="0"/>
-          <a:chExt cx="0" cy="0"/>
-        </a:xfrm>
-      </p:grpSpPr>
-      <p:sp>
-        <p:nvSpPr>
-          <p:cNvPr id="2" name="Title 1"/>
-          <p:cNvSpPr>
-            <a:spLocks noGrp="1"/>
-          </p:cNvSpPr>
-          <p:nvPr>
-            <p:ph type="title"/>
-          </p:nvPr>
-        </p:nvSpPr>
-        <p:spPr/>
-        <p:txBody>
-          <a:bodyPr/>
-          <a:lstStyle/>
-          <a:p>
-            <a:pPr lvl="0" indent="0" marL="0">
-              <a:buNone/>
-            </a:pPr>
-            <a:r>
-              <a:rPr/>
-              <a:t>Bias in Algorithms</a:t>
-            </a:r>
-          </a:p>
-        </p:txBody>
-      </p:sp>
-      <p:sp>
-        <p:nvSpPr>
-          <p:cNvPr id="3" name="Content Placeholder 2"/>
-          <p:cNvSpPr>
-            <a:spLocks noGrp="1"/>
-          </p:cNvSpPr>
-          <p:nvPr>
-            <p:ph idx="1"/>
-          </p:nvPr>
-        </p:nvSpPr>
-        <p:spPr/>
-        <p:txBody>
-          <a:bodyPr/>
-          <a:lstStyle/>
-          <a:p>
-            <a:pPr lvl="0" indent="0" marL="0">
-              <a:buNone/>
-            </a:pPr>
-            <a:r>
-              <a:rPr/>
-              <a:t>https://fra.europa.eu/sites/default/files/fra_uploads/fra-2022-bias-in-algorithms_en.pdf</a:t>
             </a:r>
           </a:p>
         </p:txBody>
@@ -11325,6 +12240,150 @@
             <a:r>
               <a:rPr/>
               <a:t>My goal: help you to become a better consumer of statistics</a:t>
+            </a:r>
+          </a:p>
+        </p:txBody>
+      </p:sp>
+    </p:spTree>
+  </p:cSld>
+</p:sld>
+</file>
+
+<file path=ppt/slides/slide50.xml><?xml version="1.0" encoding="utf-8"?>
+<p:sld xmlns:a="http://schemas.openxmlformats.org/drawingml/2006/main" xmlns:r="http://schemas.openxmlformats.org/officeDocument/2006/relationships" xmlns:p="http://schemas.openxmlformats.org/presentationml/2006/main">
+  <p:cSld>
+    <p:spTree>
+      <p:nvGrpSpPr>
+        <p:cNvPr id="1" name=""/>
+        <p:cNvGrpSpPr/>
+        <p:nvPr/>
+      </p:nvGrpSpPr>
+      <p:grpSpPr>
+        <a:xfrm>
+          <a:off x="0" y="0"/>
+          <a:ext cx="0" cy="0"/>
+          <a:chOff x="0" y="0"/>
+          <a:chExt cx="0" cy="0"/>
+        </a:xfrm>
+      </p:grpSpPr>
+      <p:sp>
+        <p:nvSpPr>
+          <p:cNvPr id="2" name="Title 1"/>
+          <p:cNvSpPr>
+            <a:spLocks noGrp="1"/>
+          </p:cNvSpPr>
+          <p:nvPr>
+            <p:ph type="title"/>
+          </p:nvPr>
+        </p:nvSpPr>
+        <p:spPr/>
+        <p:txBody>
+          <a:bodyPr/>
+          <a:lstStyle/>
+          <a:p>
+            <a:pPr lvl="0" indent="0" marL="0">
+              <a:buNone/>
+            </a:pPr>
+            <a:r>
+              <a:rPr/>
+              <a:t>Machine Bias</a:t>
+            </a:r>
+          </a:p>
+        </p:txBody>
+      </p:sp>
+      <p:sp>
+        <p:nvSpPr>
+          <p:cNvPr id="3" name="Content Placeholder 2"/>
+          <p:cNvSpPr>
+            <a:spLocks noGrp="1"/>
+          </p:cNvSpPr>
+          <p:nvPr>
+            <p:ph idx="1"/>
+          </p:nvPr>
+        </p:nvSpPr>
+        <p:spPr/>
+        <p:txBody>
+          <a:bodyPr/>
+          <a:lstStyle/>
+          <a:p>
+            <a:pPr lvl="0" indent="0" marL="0">
+              <a:buNone/>
+            </a:pPr>
+            <a:r>
+              <a:rPr/>
+              <a:t>https://www.propublica.org/article/machine-bias-risk-assessments-in-criminal-sentencing</a:t>
+            </a:r>
+          </a:p>
+        </p:txBody>
+      </p:sp>
+    </p:spTree>
+  </p:cSld>
+</p:sld>
+</file>
+
+<file path=ppt/slides/slide51.xml><?xml version="1.0" encoding="utf-8"?>
+<p:sld xmlns:a="http://schemas.openxmlformats.org/drawingml/2006/main" xmlns:r="http://schemas.openxmlformats.org/officeDocument/2006/relationships" xmlns:p="http://schemas.openxmlformats.org/presentationml/2006/main">
+  <p:cSld>
+    <p:spTree>
+      <p:nvGrpSpPr>
+        <p:cNvPr id="1" name=""/>
+        <p:cNvGrpSpPr/>
+        <p:nvPr/>
+      </p:nvGrpSpPr>
+      <p:grpSpPr>
+        <a:xfrm>
+          <a:off x="0" y="0"/>
+          <a:ext cx="0" cy="0"/>
+          <a:chOff x="0" y="0"/>
+          <a:chExt cx="0" cy="0"/>
+        </a:xfrm>
+      </p:grpSpPr>
+      <p:sp>
+        <p:nvSpPr>
+          <p:cNvPr id="2" name="Title 1"/>
+          <p:cNvSpPr>
+            <a:spLocks noGrp="1"/>
+          </p:cNvSpPr>
+          <p:nvPr>
+            <p:ph type="title"/>
+          </p:nvPr>
+        </p:nvSpPr>
+        <p:spPr/>
+        <p:txBody>
+          <a:bodyPr/>
+          <a:lstStyle/>
+          <a:p>
+            <a:pPr lvl="0" indent="0" marL="0">
+              <a:buNone/>
+            </a:pPr>
+            <a:r>
+              <a:rPr/>
+              <a:t>Bias in Algorithms</a:t>
+            </a:r>
+          </a:p>
+        </p:txBody>
+      </p:sp>
+      <p:sp>
+        <p:nvSpPr>
+          <p:cNvPr id="3" name="Content Placeholder 2"/>
+          <p:cNvSpPr>
+            <a:spLocks noGrp="1"/>
+          </p:cNvSpPr>
+          <p:nvPr>
+            <p:ph idx="1"/>
+          </p:nvPr>
+        </p:nvSpPr>
+        <p:spPr/>
+        <p:txBody>
+          <a:bodyPr/>
+          <a:lstStyle/>
+          <a:p>
+            <a:pPr lvl="0" indent="0" marL="0">
+              <a:buNone/>
+            </a:pPr>
+            <a:r>
+              <a:rPr/>
+              <a:t>https://fra.europa.eu/sites/default/files/fra_uploads/fra-2022-bias-in-algorithms_en.pdf</a:t>
             </a:r>
           </a:p>
         </p:txBody>

</xml_diff>